<commit_message>
Subiendo lo último del IDI
</commit_message>
<xml_diff>
--- a/IDI 1/Enunciado de Alcance/WBS.pptx
+++ b/IDI 1/Enunciado de Alcance/WBS.pptx
@@ -2,13 +2,13 @@
 <file path=ppt/presentation.xml><?xml version="1.0" encoding="utf-8"?>
 <p:presentation xmlns:a="http://schemas.openxmlformats.org/drawingml/2006/main" xmlns:r="http://schemas.openxmlformats.org/officeDocument/2006/relationships" xmlns:p="http://schemas.openxmlformats.org/presentationml/2006/main" saveSubsetFonts="1" autoCompressPictures="0">
   <p:sldMasterIdLst>
-    <p:sldMasterId id="2147483648" r:id="rId1"/>
+    <p:sldMasterId id="2147483648" r:id="rId4"/>
   </p:sldMasterIdLst>
   <p:sldIdLst>
-    <p:sldId id="256" r:id="rId2"/>
-    <p:sldId id="257" r:id="rId3"/>
-    <p:sldId id="258" r:id="rId4"/>
-    <p:sldId id="259" r:id="rId5"/>
+    <p:sldId id="256" r:id="rId5"/>
+    <p:sldId id="257" r:id="rId6"/>
+    <p:sldId id="258" r:id="rId7"/>
+    <p:sldId id="259" r:id="rId8"/>
   </p:sldIdLst>
   <p:sldSz cx="12192000" cy="6858000"/>
   <p:notesSz cx="6858000" cy="9144000"/>
@@ -107,7 +107,16 @@
       </a:defRPr>
     </a:lvl9pPr>
   </p:defaultTextStyle>
+  <p:extLst>
+    <p:ext uri="{EFAFB233-063F-42B5-8137-9DF3F51BA10A}">
+      <p15:sldGuideLst xmlns:p15="http://schemas.microsoft.com/office/powerpoint/2012/main"/>
+    </p:ext>
+  </p:extLst>
 </p:presentation>
+</file>
+
+<file path=ppt/revisionInfo.xml><?xml version="1.0" encoding="utf-8"?>
+<p1510:revInfo xmlns:a="http://schemas.openxmlformats.org/drawingml/2006/main" xmlns:r="http://schemas.openxmlformats.org/officeDocument/2006/relationships" xmlns:p1510="http://schemas.microsoft.com/office/powerpoint/2015/10/main"/>
 </file>
 
 <file path=ppt/slideLayouts/slideLayout1.xml><?xml version="1.0" encoding="utf-8"?>
@@ -152,10 +161,9 @@
           </a:lstStyle>
           <a:p>
             <a:r>
-              <a:rPr lang="en-US" smtClean="0"/>
+              <a:rPr lang="en-US"/>
               <a:t>Click to edit Master title style</a:t>
             </a:r>
-            <a:endParaRPr lang="en-US"/>
           </a:p>
         </p:txBody>
       </p:sp>
@@ -217,10 +225,9 @@
           </a:lstStyle>
           <a:p>
             <a:r>
-              <a:rPr lang="en-US" smtClean="0"/>
+              <a:rPr lang="en-US"/>
               <a:t>Click to edit Master subtitle style</a:t>
             </a:r>
-            <a:endParaRPr lang="en-US"/>
           </a:p>
         </p:txBody>
       </p:sp>
@@ -241,9 +248,9 @@
           <a:p>
             <a:fld id="{9FD128EC-FCA0-9C4D-AC4F-4CF2932FC902}" type="datetimeFigureOut">
               <a:rPr lang="en-US" smtClean="0"/>
-              <a:t>11/9/17</a:t>
+              <a:t>11/29/2017</a:t>
             </a:fld>
-            <a:endParaRPr lang="en-US" dirty="0"/>
+            <a:endParaRPr lang="en-US"/>
           </a:p>
         </p:txBody>
       </p:sp>
@@ -262,7 +269,7 @@
           <a:bodyPr/>
           <a:lstStyle/>
           <a:p>
-            <a:endParaRPr lang="en-US" dirty="0"/>
+            <a:endParaRPr lang="en-US"/>
           </a:p>
         </p:txBody>
       </p:sp>
@@ -283,9 +290,9 @@
           <a:p>
             <a:fld id="{9EC32866-7DEA-CC4A-98FE-3A2463EC3BE1}" type="slidenum">
               <a:rPr lang="en-US" smtClean="0"/>
-              <a:t>‹#›</a:t>
+              <a:t>‹Nº›</a:t>
             </a:fld>
-            <a:endParaRPr lang="en-US" dirty="0"/>
+            <a:endParaRPr lang="en-US"/>
           </a:p>
         </p:txBody>
       </p:sp>
@@ -335,10 +342,9 @@
           <a:lstStyle/>
           <a:p>
             <a:r>
-              <a:rPr lang="en-US" smtClean="0"/>
+              <a:rPr lang="en-US"/>
               <a:t>Click to edit Master title style</a:t>
             </a:r>
-            <a:endParaRPr lang="en-US"/>
           </a:p>
         </p:txBody>
       </p:sp>
@@ -359,38 +365,37 @@
           <a:p>
             <a:pPr lvl="0"/>
             <a:r>
-              <a:rPr lang="en-US" smtClean="0"/>
+              <a:rPr lang="en-US"/>
               <a:t>Click to edit Master text styles</a:t>
             </a:r>
           </a:p>
           <a:p>
             <a:pPr lvl="1"/>
             <a:r>
-              <a:rPr lang="en-US" smtClean="0"/>
+              <a:rPr lang="en-US"/>
               <a:t>Second level</a:t>
             </a:r>
           </a:p>
           <a:p>
             <a:pPr lvl="2"/>
             <a:r>
-              <a:rPr lang="en-US" smtClean="0"/>
+              <a:rPr lang="en-US"/>
               <a:t>Third level</a:t>
             </a:r>
           </a:p>
           <a:p>
             <a:pPr lvl="3"/>
             <a:r>
-              <a:rPr lang="en-US" smtClean="0"/>
+              <a:rPr lang="en-US"/>
               <a:t>Fourth level</a:t>
             </a:r>
           </a:p>
           <a:p>
             <a:pPr lvl="4"/>
             <a:r>
-              <a:rPr lang="en-US" smtClean="0"/>
+              <a:rPr lang="en-US"/>
               <a:t>Fifth level</a:t>
             </a:r>
-            <a:endParaRPr lang="en-US"/>
           </a:p>
         </p:txBody>
       </p:sp>
@@ -411,9 +416,9 @@
           <a:p>
             <a:fld id="{9FD128EC-FCA0-9C4D-AC4F-4CF2932FC902}" type="datetimeFigureOut">
               <a:rPr lang="en-US" smtClean="0"/>
-              <a:t>11/9/17</a:t>
+              <a:t>11/29/2017</a:t>
             </a:fld>
-            <a:endParaRPr lang="en-US" dirty="0"/>
+            <a:endParaRPr lang="en-US"/>
           </a:p>
         </p:txBody>
       </p:sp>
@@ -432,7 +437,7 @@
           <a:bodyPr/>
           <a:lstStyle/>
           <a:p>
-            <a:endParaRPr lang="en-US" dirty="0"/>
+            <a:endParaRPr lang="en-US"/>
           </a:p>
         </p:txBody>
       </p:sp>
@@ -453,9 +458,9 @@
           <a:p>
             <a:fld id="{9EC32866-7DEA-CC4A-98FE-3A2463EC3BE1}" type="slidenum">
               <a:rPr lang="en-US" smtClean="0"/>
-              <a:t>‹#›</a:t>
+              <a:t>‹Nº›</a:t>
             </a:fld>
-            <a:endParaRPr lang="en-US" dirty="0"/>
+            <a:endParaRPr lang="en-US"/>
           </a:p>
         </p:txBody>
       </p:sp>
@@ -510,10 +515,9 @@
           <a:lstStyle/>
           <a:p>
             <a:r>
-              <a:rPr lang="en-US" smtClean="0"/>
+              <a:rPr lang="en-US"/>
               <a:t>Click to edit Master title style</a:t>
             </a:r>
-            <a:endParaRPr lang="en-US"/>
           </a:p>
         </p:txBody>
       </p:sp>
@@ -539,38 +543,37 @@
           <a:p>
             <a:pPr lvl="0"/>
             <a:r>
-              <a:rPr lang="en-US" smtClean="0"/>
+              <a:rPr lang="en-US"/>
               <a:t>Click to edit Master text styles</a:t>
             </a:r>
           </a:p>
           <a:p>
             <a:pPr lvl="1"/>
             <a:r>
-              <a:rPr lang="en-US" smtClean="0"/>
+              <a:rPr lang="en-US"/>
               <a:t>Second level</a:t>
             </a:r>
           </a:p>
           <a:p>
             <a:pPr lvl="2"/>
             <a:r>
-              <a:rPr lang="en-US" smtClean="0"/>
+              <a:rPr lang="en-US"/>
               <a:t>Third level</a:t>
             </a:r>
           </a:p>
           <a:p>
             <a:pPr lvl="3"/>
             <a:r>
-              <a:rPr lang="en-US" smtClean="0"/>
+              <a:rPr lang="en-US"/>
               <a:t>Fourth level</a:t>
             </a:r>
           </a:p>
           <a:p>
             <a:pPr lvl="4"/>
             <a:r>
-              <a:rPr lang="en-US" smtClean="0"/>
+              <a:rPr lang="en-US"/>
               <a:t>Fifth level</a:t>
             </a:r>
-            <a:endParaRPr lang="en-US"/>
           </a:p>
         </p:txBody>
       </p:sp>
@@ -591,9 +594,9 @@
           <a:p>
             <a:fld id="{9FD128EC-FCA0-9C4D-AC4F-4CF2932FC902}" type="datetimeFigureOut">
               <a:rPr lang="en-US" smtClean="0"/>
-              <a:t>11/9/17</a:t>
+              <a:t>11/29/2017</a:t>
             </a:fld>
-            <a:endParaRPr lang="en-US" dirty="0"/>
+            <a:endParaRPr lang="en-US"/>
           </a:p>
         </p:txBody>
       </p:sp>
@@ -612,7 +615,7 @@
           <a:bodyPr/>
           <a:lstStyle/>
           <a:p>
-            <a:endParaRPr lang="en-US" dirty="0"/>
+            <a:endParaRPr lang="en-US"/>
           </a:p>
         </p:txBody>
       </p:sp>
@@ -633,9 +636,9 @@
           <a:p>
             <a:fld id="{9EC32866-7DEA-CC4A-98FE-3A2463EC3BE1}" type="slidenum">
               <a:rPr lang="en-US" smtClean="0"/>
-              <a:t>‹#›</a:t>
+              <a:t>‹Nº›</a:t>
             </a:fld>
-            <a:endParaRPr lang="en-US" dirty="0"/>
+            <a:endParaRPr lang="en-US"/>
           </a:p>
         </p:txBody>
       </p:sp>
@@ -685,10 +688,9 @@
           <a:lstStyle/>
           <a:p>
             <a:r>
-              <a:rPr lang="en-US" smtClean="0"/>
+              <a:rPr lang="en-US"/>
               <a:t>Click to edit Master title style</a:t>
             </a:r>
-            <a:endParaRPr lang="en-US"/>
           </a:p>
         </p:txBody>
       </p:sp>
@@ -709,38 +711,37 @@
           <a:p>
             <a:pPr lvl="0"/>
             <a:r>
-              <a:rPr lang="en-US" smtClean="0"/>
+              <a:rPr lang="en-US"/>
               <a:t>Click to edit Master text styles</a:t>
             </a:r>
           </a:p>
           <a:p>
             <a:pPr lvl="1"/>
             <a:r>
-              <a:rPr lang="en-US" smtClean="0"/>
+              <a:rPr lang="en-US"/>
               <a:t>Second level</a:t>
             </a:r>
           </a:p>
           <a:p>
             <a:pPr lvl="2"/>
             <a:r>
-              <a:rPr lang="en-US" smtClean="0"/>
+              <a:rPr lang="en-US"/>
               <a:t>Third level</a:t>
             </a:r>
           </a:p>
           <a:p>
             <a:pPr lvl="3"/>
             <a:r>
-              <a:rPr lang="en-US" smtClean="0"/>
+              <a:rPr lang="en-US"/>
               <a:t>Fourth level</a:t>
             </a:r>
           </a:p>
           <a:p>
             <a:pPr lvl="4"/>
             <a:r>
-              <a:rPr lang="en-US" smtClean="0"/>
+              <a:rPr lang="en-US"/>
               <a:t>Fifth level</a:t>
             </a:r>
-            <a:endParaRPr lang="en-US"/>
           </a:p>
         </p:txBody>
       </p:sp>
@@ -761,9 +762,9 @@
           <a:p>
             <a:fld id="{9FD128EC-FCA0-9C4D-AC4F-4CF2932FC902}" type="datetimeFigureOut">
               <a:rPr lang="en-US" smtClean="0"/>
-              <a:t>11/9/17</a:t>
+              <a:t>11/29/2017</a:t>
             </a:fld>
-            <a:endParaRPr lang="en-US" dirty="0"/>
+            <a:endParaRPr lang="en-US"/>
           </a:p>
         </p:txBody>
       </p:sp>
@@ -782,7 +783,7 @@
           <a:bodyPr/>
           <a:lstStyle/>
           <a:p>
-            <a:endParaRPr lang="en-US" dirty="0"/>
+            <a:endParaRPr lang="en-US"/>
           </a:p>
         </p:txBody>
       </p:sp>
@@ -803,9 +804,9 @@
           <a:p>
             <a:fld id="{9EC32866-7DEA-CC4A-98FE-3A2463EC3BE1}" type="slidenum">
               <a:rPr lang="en-US" smtClean="0"/>
-              <a:t>‹#›</a:t>
+              <a:t>‹Nº›</a:t>
             </a:fld>
-            <a:endParaRPr lang="en-US" dirty="0"/>
+            <a:endParaRPr lang="en-US"/>
           </a:p>
         </p:txBody>
       </p:sp>
@@ -864,10 +865,9 @@
           </a:lstStyle>
           <a:p>
             <a:r>
-              <a:rPr lang="en-US" smtClean="0"/>
+              <a:rPr lang="en-US"/>
               <a:t>Click to edit Master title style</a:t>
             </a:r>
-            <a:endParaRPr lang="en-US"/>
           </a:p>
         </p:txBody>
       </p:sp>
@@ -984,7 +984,7 @@
           <a:p>
             <a:pPr lvl="0"/>
             <a:r>
-              <a:rPr lang="en-US" smtClean="0"/>
+              <a:rPr lang="en-US"/>
               <a:t>Click to edit Master text styles</a:t>
             </a:r>
           </a:p>
@@ -1007,9 +1007,9 @@
           <a:p>
             <a:fld id="{9FD128EC-FCA0-9C4D-AC4F-4CF2932FC902}" type="datetimeFigureOut">
               <a:rPr lang="en-US" smtClean="0"/>
-              <a:t>11/9/17</a:t>
+              <a:t>11/29/2017</a:t>
             </a:fld>
-            <a:endParaRPr lang="en-US" dirty="0"/>
+            <a:endParaRPr lang="en-US"/>
           </a:p>
         </p:txBody>
       </p:sp>
@@ -1028,7 +1028,7 @@
           <a:bodyPr/>
           <a:lstStyle/>
           <a:p>
-            <a:endParaRPr lang="en-US" dirty="0"/>
+            <a:endParaRPr lang="en-US"/>
           </a:p>
         </p:txBody>
       </p:sp>
@@ -1049,9 +1049,9 @@
           <a:p>
             <a:fld id="{9EC32866-7DEA-CC4A-98FE-3A2463EC3BE1}" type="slidenum">
               <a:rPr lang="en-US" smtClean="0"/>
-              <a:t>‹#›</a:t>
+              <a:t>‹Nº›</a:t>
             </a:fld>
-            <a:endParaRPr lang="en-US" dirty="0"/>
+            <a:endParaRPr lang="en-US"/>
           </a:p>
         </p:txBody>
       </p:sp>
@@ -1101,10 +1101,9 @@
           <a:lstStyle/>
           <a:p>
             <a:r>
-              <a:rPr lang="en-US" smtClean="0"/>
+              <a:rPr lang="en-US"/>
               <a:t>Click to edit Master title style</a:t>
             </a:r>
-            <a:endParaRPr lang="en-US"/>
           </a:p>
         </p:txBody>
       </p:sp>
@@ -1130,38 +1129,37 @@
           <a:p>
             <a:pPr lvl="0"/>
             <a:r>
-              <a:rPr lang="en-US" smtClean="0"/>
+              <a:rPr lang="en-US"/>
               <a:t>Click to edit Master text styles</a:t>
             </a:r>
           </a:p>
           <a:p>
             <a:pPr lvl="1"/>
             <a:r>
-              <a:rPr lang="en-US" smtClean="0"/>
+              <a:rPr lang="en-US"/>
               <a:t>Second level</a:t>
             </a:r>
           </a:p>
           <a:p>
             <a:pPr lvl="2"/>
             <a:r>
-              <a:rPr lang="en-US" smtClean="0"/>
+              <a:rPr lang="en-US"/>
               <a:t>Third level</a:t>
             </a:r>
           </a:p>
           <a:p>
             <a:pPr lvl="3"/>
             <a:r>
-              <a:rPr lang="en-US" smtClean="0"/>
+              <a:rPr lang="en-US"/>
               <a:t>Fourth level</a:t>
             </a:r>
           </a:p>
           <a:p>
             <a:pPr lvl="4"/>
             <a:r>
-              <a:rPr lang="en-US" smtClean="0"/>
+              <a:rPr lang="en-US"/>
               <a:t>Fifth level</a:t>
             </a:r>
-            <a:endParaRPr lang="en-US"/>
           </a:p>
         </p:txBody>
       </p:sp>
@@ -1187,38 +1185,37 @@
           <a:p>
             <a:pPr lvl="0"/>
             <a:r>
-              <a:rPr lang="en-US" smtClean="0"/>
+              <a:rPr lang="en-US"/>
               <a:t>Click to edit Master text styles</a:t>
             </a:r>
           </a:p>
           <a:p>
             <a:pPr lvl="1"/>
             <a:r>
-              <a:rPr lang="en-US" smtClean="0"/>
+              <a:rPr lang="en-US"/>
               <a:t>Second level</a:t>
             </a:r>
           </a:p>
           <a:p>
             <a:pPr lvl="2"/>
             <a:r>
-              <a:rPr lang="en-US" smtClean="0"/>
+              <a:rPr lang="en-US"/>
               <a:t>Third level</a:t>
             </a:r>
           </a:p>
           <a:p>
             <a:pPr lvl="3"/>
             <a:r>
-              <a:rPr lang="en-US" smtClean="0"/>
+              <a:rPr lang="en-US"/>
               <a:t>Fourth level</a:t>
             </a:r>
           </a:p>
           <a:p>
             <a:pPr lvl="4"/>
             <a:r>
-              <a:rPr lang="en-US" smtClean="0"/>
+              <a:rPr lang="en-US"/>
               <a:t>Fifth level</a:t>
             </a:r>
-            <a:endParaRPr lang="en-US"/>
           </a:p>
         </p:txBody>
       </p:sp>
@@ -1239,9 +1236,9 @@
           <a:p>
             <a:fld id="{9FD128EC-FCA0-9C4D-AC4F-4CF2932FC902}" type="datetimeFigureOut">
               <a:rPr lang="en-US" smtClean="0"/>
-              <a:t>11/9/17</a:t>
+              <a:t>11/29/2017</a:t>
             </a:fld>
-            <a:endParaRPr lang="en-US" dirty="0"/>
+            <a:endParaRPr lang="en-US"/>
           </a:p>
         </p:txBody>
       </p:sp>
@@ -1260,7 +1257,7 @@
           <a:bodyPr/>
           <a:lstStyle/>
           <a:p>
-            <a:endParaRPr lang="en-US" dirty="0"/>
+            <a:endParaRPr lang="en-US"/>
           </a:p>
         </p:txBody>
       </p:sp>
@@ -1281,9 +1278,9 @@
           <a:p>
             <a:fld id="{9EC32866-7DEA-CC4A-98FE-3A2463EC3BE1}" type="slidenum">
               <a:rPr lang="en-US" smtClean="0"/>
-              <a:t>‹#›</a:t>
+              <a:t>‹Nº›</a:t>
             </a:fld>
-            <a:endParaRPr lang="en-US" dirty="0"/>
+            <a:endParaRPr lang="en-US"/>
           </a:p>
         </p:txBody>
       </p:sp>
@@ -1338,10 +1335,9 @@
           <a:lstStyle/>
           <a:p>
             <a:r>
-              <a:rPr lang="en-US" smtClean="0"/>
+              <a:rPr lang="en-US"/>
               <a:t>Click to edit Master title style</a:t>
             </a:r>
-            <a:endParaRPr lang="en-US"/>
           </a:p>
         </p:txBody>
       </p:sp>
@@ -1404,7 +1400,7 @@
           <a:p>
             <a:pPr lvl="0"/>
             <a:r>
-              <a:rPr lang="en-US" smtClean="0"/>
+              <a:rPr lang="en-US"/>
               <a:t>Click to edit Master text styles</a:t>
             </a:r>
           </a:p>
@@ -1432,38 +1428,37 @@
           <a:p>
             <a:pPr lvl="0"/>
             <a:r>
-              <a:rPr lang="en-US" smtClean="0"/>
+              <a:rPr lang="en-US"/>
               <a:t>Click to edit Master text styles</a:t>
             </a:r>
           </a:p>
           <a:p>
             <a:pPr lvl="1"/>
             <a:r>
-              <a:rPr lang="en-US" smtClean="0"/>
+              <a:rPr lang="en-US"/>
               <a:t>Second level</a:t>
             </a:r>
           </a:p>
           <a:p>
             <a:pPr lvl="2"/>
             <a:r>
-              <a:rPr lang="en-US" smtClean="0"/>
+              <a:rPr lang="en-US"/>
               <a:t>Third level</a:t>
             </a:r>
           </a:p>
           <a:p>
             <a:pPr lvl="3"/>
             <a:r>
-              <a:rPr lang="en-US" smtClean="0"/>
+              <a:rPr lang="en-US"/>
               <a:t>Fourth level</a:t>
             </a:r>
           </a:p>
           <a:p>
             <a:pPr lvl="4"/>
             <a:r>
-              <a:rPr lang="en-US" smtClean="0"/>
+              <a:rPr lang="en-US"/>
               <a:t>Fifth level</a:t>
             </a:r>
-            <a:endParaRPr lang="en-US"/>
           </a:p>
         </p:txBody>
       </p:sp>
@@ -1526,7 +1521,7 @@
           <a:p>
             <a:pPr lvl="0"/>
             <a:r>
-              <a:rPr lang="en-US" smtClean="0"/>
+              <a:rPr lang="en-US"/>
               <a:t>Click to edit Master text styles</a:t>
             </a:r>
           </a:p>
@@ -1554,38 +1549,37 @@
           <a:p>
             <a:pPr lvl="0"/>
             <a:r>
-              <a:rPr lang="en-US" smtClean="0"/>
+              <a:rPr lang="en-US"/>
               <a:t>Click to edit Master text styles</a:t>
             </a:r>
           </a:p>
           <a:p>
             <a:pPr lvl="1"/>
             <a:r>
-              <a:rPr lang="en-US" smtClean="0"/>
+              <a:rPr lang="en-US"/>
               <a:t>Second level</a:t>
             </a:r>
           </a:p>
           <a:p>
             <a:pPr lvl="2"/>
             <a:r>
-              <a:rPr lang="en-US" smtClean="0"/>
+              <a:rPr lang="en-US"/>
               <a:t>Third level</a:t>
             </a:r>
           </a:p>
           <a:p>
             <a:pPr lvl="3"/>
             <a:r>
-              <a:rPr lang="en-US" smtClean="0"/>
+              <a:rPr lang="en-US"/>
               <a:t>Fourth level</a:t>
             </a:r>
           </a:p>
           <a:p>
             <a:pPr lvl="4"/>
             <a:r>
-              <a:rPr lang="en-US" smtClean="0"/>
+              <a:rPr lang="en-US"/>
               <a:t>Fifth level</a:t>
             </a:r>
-            <a:endParaRPr lang="en-US"/>
           </a:p>
         </p:txBody>
       </p:sp>
@@ -1606,9 +1600,9 @@
           <a:p>
             <a:fld id="{9FD128EC-FCA0-9C4D-AC4F-4CF2932FC902}" type="datetimeFigureOut">
               <a:rPr lang="en-US" smtClean="0"/>
-              <a:t>11/9/17</a:t>
+              <a:t>11/29/2017</a:t>
             </a:fld>
-            <a:endParaRPr lang="en-US" dirty="0"/>
+            <a:endParaRPr lang="en-US"/>
           </a:p>
         </p:txBody>
       </p:sp>
@@ -1627,7 +1621,7 @@
           <a:bodyPr/>
           <a:lstStyle/>
           <a:p>
-            <a:endParaRPr lang="en-US" dirty="0"/>
+            <a:endParaRPr lang="en-US"/>
           </a:p>
         </p:txBody>
       </p:sp>
@@ -1648,9 +1642,9 @@
           <a:p>
             <a:fld id="{9EC32866-7DEA-CC4A-98FE-3A2463EC3BE1}" type="slidenum">
               <a:rPr lang="en-US" smtClean="0"/>
-              <a:t>‹#›</a:t>
+              <a:t>‹Nº›</a:t>
             </a:fld>
-            <a:endParaRPr lang="en-US" dirty="0"/>
+            <a:endParaRPr lang="en-US"/>
           </a:p>
         </p:txBody>
       </p:sp>
@@ -1700,10 +1694,9 @@
           <a:lstStyle/>
           <a:p>
             <a:r>
-              <a:rPr lang="en-US" smtClean="0"/>
+              <a:rPr lang="en-US"/>
               <a:t>Click to edit Master title style</a:t>
             </a:r>
-            <a:endParaRPr lang="en-US"/>
           </a:p>
         </p:txBody>
       </p:sp>
@@ -1724,9 +1717,9 @@
           <a:p>
             <a:fld id="{9FD128EC-FCA0-9C4D-AC4F-4CF2932FC902}" type="datetimeFigureOut">
               <a:rPr lang="en-US" smtClean="0"/>
-              <a:t>11/9/17</a:t>
+              <a:t>11/29/2017</a:t>
             </a:fld>
-            <a:endParaRPr lang="en-US" dirty="0"/>
+            <a:endParaRPr lang="en-US"/>
           </a:p>
         </p:txBody>
       </p:sp>
@@ -1745,7 +1738,7 @@
           <a:bodyPr/>
           <a:lstStyle/>
           <a:p>
-            <a:endParaRPr lang="en-US" dirty="0"/>
+            <a:endParaRPr lang="en-US"/>
           </a:p>
         </p:txBody>
       </p:sp>
@@ -1766,9 +1759,9 @@
           <a:p>
             <a:fld id="{9EC32866-7DEA-CC4A-98FE-3A2463EC3BE1}" type="slidenum">
               <a:rPr lang="en-US" smtClean="0"/>
-              <a:t>‹#›</a:t>
+              <a:t>‹Nº›</a:t>
             </a:fld>
-            <a:endParaRPr lang="en-US" dirty="0"/>
+            <a:endParaRPr lang="en-US"/>
           </a:p>
         </p:txBody>
       </p:sp>
@@ -1819,9 +1812,9 @@
           <a:p>
             <a:fld id="{9FD128EC-FCA0-9C4D-AC4F-4CF2932FC902}" type="datetimeFigureOut">
               <a:rPr lang="en-US" smtClean="0"/>
-              <a:t>11/9/17</a:t>
+              <a:t>11/29/2017</a:t>
             </a:fld>
-            <a:endParaRPr lang="en-US" dirty="0"/>
+            <a:endParaRPr lang="en-US"/>
           </a:p>
         </p:txBody>
       </p:sp>
@@ -1840,7 +1833,7 @@
           <a:bodyPr/>
           <a:lstStyle/>
           <a:p>
-            <a:endParaRPr lang="en-US" dirty="0"/>
+            <a:endParaRPr lang="en-US"/>
           </a:p>
         </p:txBody>
       </p:sp>
@@ -1861,9 +1854,9 @@
           <a:p>
             <a:fld id="{9EC32866-7DEA-CC4A-98FE-3A2463EC3BE1}" type="slidenum">
               <a:rPr lang="en-US" smtClean="0"/>
-              <a:t>‹#›</a:t>
+              <a:t>‹Nº›</a:t>
             </a:fld>
-            <a:endParaRPr lang="en-US" dirty="0"/>
+            <a:endParaRPr lang="en-US"/>
           </a:p>
         </p:txBody>
       </p:sp>
@@ -1922,10 +1915,9 @@
           </a:lstStyle>
           <a:p>
             <a:r>
-              <a:rPr lang="en-US" smtClean="0"/>
+              <a:rPr lang="en-US"/>
               <a:t>Click to edit Master title style</a:t>
             </a:r>
-            <a:endParaRPr lang="en-US"/>
           </a:p>
         </p:txBody>
       </p:sp>
@@ -1979,38 +1971,37 @@
           <a:p>
             <a:pPr lvl="0"/>
             <a:r>
-              <a:rPr lang="en-US" smtClean="0"/>
+              <a:rPr lang="en-US"/>
               <a:t>Click to edit Master text styles</a:t>
             </a:r>
           </a:p>
           <a:p>
             <a:pPr lvl="1"/>
             <a:r>
-              <a:rPr lang="en-US" smtClean="0"/>
+              <a:rPr lang="en-US"/>
               <a:t>Second level</a:t>
             </a:r>
           </a:p>
           <a:p>
             <a:pPr lvl="2"/>
             <a:r>
-              <a:rPr lang="en-US" smtClean="0"/>
+              <a:rPr lang="en-US"/>
               <a:t>Third level</a:t>
             </a:r>
           </a:p>
           <a:p>
             <a:pPr lvl="3"/>
             <a:r>
-              <a:rPr lang="en-US" smtClean="0"/>
+              <a:rPr lang="en-US"/>
               <a:t>Fourth level</a:t>
             </a:r>
           </a:p>
           <a:p>
             <a:pPr lvl="4"/>
             <a:r>
-              <a:rPr lang="en-US" smtClean="0"/>
+              <a:rPr lang="en-US"/>
               <a:t>Fifth level</a:t>
             </a:r>
-            <a:endParaRPr lang="en-US"/>
           </a:p>
         </p:txBody>
       </p:sp>
@@ -2073,7 +2064,7 @@
           <a:p>
             <a:pPr lvl="0"/>
             <a:r>
-              <a:rPr lang="en-US" smtClean="0"/>
+              <a:rPr lang="en-US"/>
               <a:t>Click to edit Master text styles</a:t>
             </a:r>
           </a:p>
@@ -2096,9 +2087,9 @@
           <a:p>
             <a:fld id="{9FD128EC-FCA0-9C4D-AC4F-4CF2932FC902}" type="datetimeFigureOut">
               <a:rPr lang="en-US" smtClean="0"/>
-              <a:t>11/9/17</a:t>
+              <a:t>11/29/2017</a:t>
             </a:fld>
-            <a:endParaRPr lang="en-US" dirty="0"/>
+            <a:endParaRPr lang="en-US"/>
           </a:p>
         </p:txBody>
       </p:sp>
@@ -2117,7 +2108,7 @@
           <a:bodyPr/>
           <a:lstStyle/>
           <a:p>
-            <a:endParaRPr lang="en-US" dirty="0"/>
+            <a:endParaRPr lang="en-US"/>
           </a:p>
         </p:txBody>
       </p:sp>
@@ -2138,9 +2129,9 @@
           <a:p>
             <a:fld id="{9EC32866-7DEA-CC4A-98FE-3A2463EC3BE1}" type="slidenum">
               <a:rPr lang="en-US" smtClean="0"/>
-              <a:t>‹#›</a:t>
+              <a:t>‹Nº›</a:t>
             </a:fld>
-            <a:endParaRPr lang="en-US" dirty="0"/>
+            <a:endParaRPr lang="en-US"/>
           </a:p>
         </p:txBody>
       </p:sp>
@@ -2199,10 +2190,9 @@
           </a:lstStyle>
           <a:p>
             <a:r>
-              <a:rPr lang="en-US" smtClean="0"/>
+              <a:rPr lang="en-US"/>
               <a:t>Click to edit Master title style</a:t>
             </a:r>
-            <a:endParaRPr lang="en-US"/>
           </a:p>
         </p:txBody>
       </p:sp>
@@ -2263,7 +2253,7 @@
             </a:lvl9pPr>
           </a:lstStyle>
           <a:p>
-            <a:endParaRPr lang="en-US" dirty="0"/>
+            <a:endParaRPr lang="en-US"/>
           </a:p>
         </p:txBody>
       </p:sp>
@@ -2326,7 +2316,7 @@
           <a:p>
             <a:pPr lvl="0"/>
             <a:r>
-              <a:rPr lang="en-US" smtClean="0"/>
+              <a:rPr lang="en-US"/>
               <a:t>Click to edit Master text styles</a:t>
             </a:r>
           </a:p>
@@ -2349,9 +2339,9 @@
           <a:p>
             <a:fld id="{9FD128EC-FCA0-9C4D-AC4F-4CF2932FC902}" type="datetimeFigureOut">
               <a:rPr lang="en-US" smtClean="0"/>
-              <a:t>11/9/17</a:t>
+              <a:t>11/29/2017</a:t>
             </a:fld>
-            <a:endParaRPr lang="en-US" dirty="0"/>
+            <a:endParaRPr lang="en-US"/>
           </a:p>
         </p:txBody>
       </p:sp>
@@ -2370,7 +2360,7 @@
           <a:bodyPr/>
           <a:lstStyle/>
           <a:p>
-            <a:endParaRPr lang="en-US" dirty="0"/>
+            <a:endParaRPr lang="en-US"/>
           </a:p>
         </p:txBody>
       </p:sp>
@@ -2391,9 +2381,9 @@
           <a:p>
             <a:fld id="{9EC32866-7DEA-CC4A-98FE-3A2463EC3BE1}" type="slidenum">
               <a:rPr lang="en-US" smtClean="0"/>
-              <a:t>‹#›</a:t>
+              <a:t>‹Nº›</a:t>
             </a:fld>
-            <a:endParaRPr lang="en-US" dirty="0"/>
+            <a:endParaRPr lang="en-US"/>
           </a:p>
         </p:txBody>
       </p:sp>
@@ -2458,10 +2448,9 @@
           <a:lstStyle/>
           <a:p>
             <a:r>
-              <a:rPr lang="en-US" smtClean="0"/>
+              <a:rPr lang="en-US"/>
               <a:t>Click to edit Master title style</a:t>
             </a:r>
-            <a:endParaRPr lang="en-US"/>
           </a:p>
         </p:txBody>
       </p:sp>
@@ -2492,38 +2481,37 @@
           <a:p>
             <a:pPr lvl="0"/>
             <a:r>
-              <a:rPr lang="en-US" smtClean="0"/>
+              <a:rPr lang="en-US"/>
               <a:t>Click to edit Master text styles</a:t>
             </a:r>
           </a:p>
           <a:p>
             <a:pPr lvl="1"/>
             <a:r>
-              <a:rPr lang="en-US" smtClean="0"/>
+              <a:rPr lang="en-US"/>
               <a:t>Second level</a:t>
             </a:r>
           </a:p>
           <a:p>
             <a:pPr lvl="2"/>
             <a:r>
-              <a:rPr lang="en-US" smtClean="0"/>
+              <a:rPr lang="en-US"/>
               <a:t>Third level</a:t>
             </a:r>
           </a:p>
           <a:p>
             <a:pPr lvl="3"/>
             <a:r>
-              <a:rPr lang="en-US" smtClean="0"/>
+              <a:rPr lang="en-US"/>
               <a:t>Fourth level</a:t>
             </a:r>
           </a:p>
           <a:p>
             <a:pPr lvl="4"/>
             <a:r>
-              <a:rPr lang="en-US" smtClean="0"/>
+              <a:rPr lang="en-US"/>
               <a:t>Fifth level</a:t>
             </a:r>
-            <a:endParaRPr lang="en-US"/>
           </a:p>
         </p:txBody>
       </p:sp>
@@ -2562,9 +2550,9 @@
           <a:p>
             <a:fld id="{9FD128EC-FCA0-9C4D-AC4F-4CF2932FC902}" type="datetimeFigureOut">
               <a:rPr lang="en-US" smtClean="0"/>
-              <a:t>11/9/17</a:t>
+              <a:t>11/29/2017</a:t>
             </a:fld>
-            <a:endParaRPr lang="en-US" dirty="0"/>
+            <a:endParaRPr lang="en-US"/>
           </a:p>
         </p:txBody>
       </p:sp>
@@ -2601,7 +2589,7 @@
             </a:lvl1pPr>
           </a:lstStyle>
           <a:p>
-            <a:endParaRPr lang="en-US" dirty="0"/>
+            <a:endParaRPr lang="en-US"/>
           </a:p>
         </p:txBody>
       </p:sp>
@@ -2640,9 +2628,9 @@
           <a:p>
             <a:fld id="{9EC32866-7DEA-CC4A-98FE-3A2463EC3BE1}" type="slidenum">
               <a:rPr lang="en-US" smtClean="0"/>
-              <a:t>‹#›</a:t>
+              <a:t>‹Nº›</a:t>
             </a:fld>
-            <a:endParaRPr lang="en-US" dirty="0"/>
+            <a:endParaRPr lang="en-US"/>
           </a:p>
         </p:txBody>
       </p:sp>
@@ -2975,7 +2963,7 @@
         </p:nvSpPr>
         <p:spPr>
           <a:xfrm>
-            <a:off x="6298547" y="168182"/>
+            <a:off x="5526387" y="-797018"/>
             <a:ext cx="2010844" cy="636104"/>
           </a:xfrm>
           <a:prstGeom prst="rect">
@@ -3004,18 +2992,13 @@
           <a:p>
             <a:pPr algn="ctr"/>
             <a:r>
-              <a:rPr lang="en-US" dirty="0" smtClean="0">
+              <a:rPr lang="es-ES">
                 <a:solidFill>
                   <a:schemeClr val="bg1"/>
                 </a:solidFill>
               </a:rPr>
               <a:t>TOG</a:t>
             </a:r>
-            <a:endParaRPr lang="en-US" dirty="0">
-              <a:solidFill>
-                <a:schemeClr val="bg1"/>
-              </a:solidFill>
-            </a:endParaRPr>
           </a:p>
         </p:txBody>
       </p:sp>
@@ -3027,7 +3010,7 @@
         </p:nvSpPr>
         <p:spPr>
           <a:xfrm>
-            <a:off x="875173" y="1126155"/>
+            <a:off x="-338122" y="-11618"/>
             <a:ext cx="1367555" cy="416465"/>
           </a:xfrm>
           <a:prstGeom prst="rect">
@@ -3056,18 +3039,13 @@
           <a:p>
             <a:pPr algn="ctr"/>
             <a:r>
-              <a:rPr lang="en-US" dirty="0" smtClean="0">
+              <a:rPr lang="es-ES">
                 <a:solidFill>
                   <a:schemeClr val="bg1"/>
                 </a:solidFill>
               </a:rPr>
               <a:t>IDI 1</a:t>
             </a:r>
-            <a:endParaRPr lang="en-US" dirty="0">
-              <a:solidFill>
-                <a:schemeClr val="bg1"/>
-              </a:solidFill>
-            </a:endParaRPr>
           </a:p>
         </p:txBody>
       </p:sp>
@@ -3079,8 +3057,8 @@
         </p:nvSpPr>
         <p:spPr>
           <a:xfrm>
-            <a:off x="190552" y="1865695"/>
-            <a:ext cx="2736798" cy="646331"/>
+            <a:off x="-1449014" y="567016"/>
+            <a:ext cx="3589338" cy="1938992"/>
           </a:xfrm>
           <a:prstGeom prst="rect">
             <a:avLst/>
@@ -3103,31 +3081,75 @@
           </a:fontRef>
         </p:style>
         <p:txBody>
-          <a:bodyPr rtlCol="0" anchor="t" anchorCtr="0">
+          <a:bodyPr wrap="square" rtlCol="0" anchor="t" anchorCtr="0">
             <a:spAutoFit/>
           </a:bodyPr>
           <a:lstStyle/>
           <a:p>
+            <a:pPr fontAlgn="ctr"/>
+            <a:r>
+              <a:rPr lang="es-ES" sz="1200" dirty="0"/>
+              <a:t>TOG</a:t>
+            </a:r>
+          </a:p>
+          <a:p>
             <a:pPr marL="342900" indent="-342900" fontAlgn="ctr">
-              <a:buFont typeface="+mj-lt"/>
               <a:buAutoNum type="arabicPeriod"/>
             </a:pPr>
             <a:r>
               <a:rPr lang="es-ES" sz="1200" dirty="0"/>
               <a:t>Plan de administración del proyecto</a:t>
             </a:r>
+          </a:p>
+          <a:p>
+            <a:pPr fontAlgn="ctr"/>
+            <a:endParaRPr lang="es-ES" sz="1200" dirty="0"/>
+          </a:p>
+          <a:p>
+            <a:pPr fontAlgn="ctr"/>
+            <a:r>
+              <a:rPr lang="es-ES" sz="1200" dirty="0"/>
+              <a:t>Proyecto:</a:t>
+            </a:r>
+          </a:p>
+          <a:p>
+            <a:pPr marL="342900" indent="-342900" fontAlgn="ctr">
+              <a:buAutoNum type="arabicPeriod"/>
+            </a:pPr>
+            <a:r>
+              <a:rPr lang="es-ES" sz="1200" dirty="0"/>
+              <a:t>Método para obtener el JSon de Twitter</a:t>
+            </a:r>
             <a:endParaRPr lang="en-US" sz="1200" dirty="0"/>
           </a:p>
           <a:p>
-            <a:pPr marL="800100" lvl="1" indent="-342900" fontAlgn="ctr">
-              <a:buFont typeface="+mj-lt"/>
-              <a:buAutoNum type="arabicPeriod"/>
-            </a:pPr>
-            <a:r>
-              <a:rPr lang="es-ES" sz="1200" dirty="0"/>
-              <a:t>Enunciado de Alcance</a:t>
+            <a:pPr marL="342900" indent="-342900" fontAlgn="ctr">
+              <a:buAutoNum type="arabicPeriod"/>
+            </a:pPr>
+            <a:r>
+              <a:rPr lang="es-ES" sz="1200" dirty="0"/>
+              <a:t>Método para insertar información del JSon a la base de datos</a:t>
             </a:r>
             <a:endParaRPr lang="en-US" sz="1200" dirty="0"/>
+          </a:p>
+          <a:p>
+            <a:pPr marL="342900" indent="-342900" fontAlgn="ctr">
+              <a:buAutoNum type="arabicPeriod"/>
+            </a:pPr>
+            <a:r>
+              <a:rPr lang="es-ES" sz="1200" dirty="0"/>
+              <a:t>Método para extraer toda la información de la base de datos</a:t>
+            </a:r>
+            <a:endParaRPr lang="es-ES" dirty="0"/>
+          </a:p>
+          <a:p>
+            <a:pPr marL="342900" indent="-342900" fontAlgn="ctr">
+              <a:buAutoNum type="arabicPeriod"/>
+            </a:pPr>
+            <a:r>
+              <a:rPr lang="es-ES" sz="1200" dirty="0"/>
+              <a:t>Método para crear la matriz de adyacencia</a:t>
+            </a:r>
           </a:p>
         </p:txBody>
       </p:sp>
@@ -3139,8 +3161,8 @@
         </p:nvSpPr>
         <p:spPr>
           <a:xfrm>
-            <a:off x="3267042" y="1864490"/>
-            <a:ext cx="3590957" cy="6186309"/>
+            <a:off x="2504406" y="567016"/>
+            <a:ext cx="3590957" cy="5078313"/>
           </a:xfrm>
           <a:prstGeom prst="rect">
             <a:avLst/>
@@ -3172,7 +3194,6 @@
               <a:rPr lang="es-ES" sz="1200" dirty="0"/>
               <a:t>TOG</a:t>
             </a:r>
-            <a:endParaRPr lang="en-US" sz="1200" dirty="0"/>
           </a:p>
           <a:p>
             <a:pPr marL="342900" indent="-342900" fontAlgn="ctr">
@@ -3183,7 +3204,127 @@
               <a:rPr lang="es-ES" sz="1200" dirty="0"/>
               <a:t>Capítulo 1: Introducción</a:t>
             </a:r>
-            <a:endParaRPr lang="en-US" sz="1200" dirty="0"/>
+          </a:p>
+          <a:p>
+            <a:pPr marL="342900" indent="-342900" fontAlgn="ctr">
+              <a:buFont typeface="+mj-lt"/>
+              <a:buAutoNum type="arabicPeriod"/>
+            </a:pPr>
+            <a:r>
+              <a:rPr lang="es-ES" sz="1200" dirty="0"/>
+              <a:t>Capítulo 2: Estado del arte </a:t>
+            </a:r>
+          </a:p>
+          <a:p>
+            <a:pPr marL="342900" indent="-342900" fontAlgn="ctr">
+              <a:buFont typeface="+mj-lt"/>
+              <a:buAutoNum type="arabicPeriod"/>
+            </a:pPr>
+            <a:r>
+              <a:rPr lang="es-ES" sz="1200" dirty="0"/>
+              <a:t>Capítulo 3: Marco Teórico</a:t>
+            </a:r>
+          </a:p>
+          <a:p>
+            <a:endParaRPr lang="es-ES" sz="1200" dirty="0"/>
+          </a:p>
+          <a:p>
+            <a:r>
+              <a:rPr lang="es-ES" sz="1200" dirty="0"/>
+              <a:t>Proyecto</a:t>
+            </a:r>
+          </a:p>
+          <a:p>
+            <a:pPr marL="342900" indent="-342900" fontAlgn="ctr">
+              <a:buFont typeface="+mj-lt"/>
+              <a:buAutoNum type="arabicPeriod"/>
+            </a:pPr>
+            <a:r>
+              <a:rPr lang="es-ES" sz="1200" dirty="0"/>
+              <a:t>Métodos básicos</a:t>
+            </a:r>
+          </a:p>
+          <a:p>
+            <a:pPr marL="800100" lvl="1" indent="-342900" fontAlgn="ctr">
+              <a:buAutoNum type="arabicPeriod"/>
+            </a:pPr>
+            <a:r>
+              <a:rPr lang="es-ES" sz="1200" dirty="0"/>
+              <a:t>Método que regrese una N cantidad de nodos</a:t>
+            </a:r>
+          </a:p>
+          <a:p>
+            <a:pPr marL="800100" lvl="1" indent="-342900" fontAlgn="ctr">
+              <a:buAutoNum type="arabicPeriod"/>
+            </a:pPr>
+            <a:r>
+              <a:rPr lang="es-ES" sz="1200" dirty="0"/>
+              <a:t>Método que regrese una N cantidad de aristas</a:t>
+            </a:r>
+          </a:p>
+          <a:p>
+            <a:pPr marL="800100" lvl="1" indent="-342900" fontAlgn="ctr">
+              <a:buAutoNum type="arabicPeriod"/>
+            </a:pPr>
+            <a:r>
+              <a:rPr lang="es-ES" sz="1200" dirty="0"/>
+              <a:t>Método para regresar un estructura que represente el Grafo</a:t>
+            </a:r>
+          </a:p>
+          <a:p>
+            <a:pPr marL="342900" indent="-342900" fontAlgn="ctr">
+              <a:buAutoNum type="arabicPeriod"/>
+            </a:pPr>
+            <a:r>
+              <a:rPr lang="es-ES" sz="1200" dirty="0"/>
+              <a:t>Filtros básicos</a:t>
+            </a:r>
+          </a:p>
+          <a:p>
+            <a:pPr marL="800100" lvl="1" indent="-342900" fontAlgn="ctr">
+              <a:buAutoNum type="arabicPeriod"/>
+            </a:pPr>
+            <a:r>
+              <a:rPr lang="es-ES" sz="1200" dirty="0"/>
+              <a:t>Método básico (por definir con el asesor)</a:t>
+            </a:r>
+          </a:p>
+          <a:p>
+            <a:pPr marL="342900" indent="-342900" fontAlgn="ctr">
+              <a:buAutoNum type="arabicPeriod"/>
+            </a:pPr>
+            <a:r>
+              <a:rPr lang="es-ES" sz="1200" dirty="0"/>
+              <a:t>Análisis avanzando (parte uno):</a:t>
+            </a:r>
+          </a:p>
+          <a:p>
+            <a:pPr marL="800100" lvl="1" indent="-342900" fontAlgn="ctr">
+              <a:buAutoNum type="arabicPeriod"/>
+            </a:pPr>
+            <a:r>
+              <a:rPr lang="es-ES" sz="1200" dirty="0"/>
+              <a:t>Método para relacionar una N cantidad de grafos</a:t>
+            </a:r>
+          </a:p>
+          <a:p>
+            <a:pPr marL="800100" lvl="1" indent="-342900" fontAlgn="ctr">
+              <a:buAutoNum type="arabicPeriod"/>
+            </a:pPr>
+            <a:r>
+              <a:rPr lang="es-ES" sz="1200" dirty="0"/>
+              <a:t>Método para calcular la probabilidad de que un usuario sea un bot</a:t>
+            </a:r>
+          </a:p>
+          <a:p>
+            <a:pPr marL="342900" indent="-342900" fontAlgn="ctr">
+              <a:buFont typeface="+mj-lt"/>
+              <a:buAutoNum type="arabicPeriod"/>
+            </a:pPr>
+            <a:r>
+              <a:rPr lang="es-ES" sz="1200" dirty="0"/>
+              <a:t>Interacción básica</a:t>
+            </a:r>
           </a:p>
           <a:p>
             <a:pPr marL="800100" lvl="1" indent="-342900" fontAlgn="ctr">
@@ -3192,28 +3333,8 @@
             </a:pPr>
             <a:r>
               <a:rPr lang="es-ES" sz="1200" dirty="0"/>
-              <a:t>Pasar a limpio y mejorar lo puesto en la </a:t>
-            </a:r>
-            <a:r>
-              <a:rPr lang="es-ES" sz="1200" dirty="0" smtClean="0"/>
-              <a:t>hoja </a:t>
-            </a:r>
-            <a:r>
-              <a:rPr lang="es-ES" sz="1200" dirty="0"/>
-              <a:t>de concepto.</a:t>
-            </a:r>
-            <a:endParaRPr lang="en-US" sz="1200" dirty="0"/>
-          </a:p>
-          <a:p>
-            <a:pPr marL="342900" indent="-342900" fontAlgn="ctr">
-              <a:buFont typeface="+mj-lt"/>
-              <a:buAutoNum type="arabicPeriod"/>
-            </a:pPr>
-            <a:r>
-              <a:rPr lang="es-ES" sz="1200" dirty="0"/>
-              <a:t>Capítulo 2: Estado del arte </a:t>
-            </a:r>
-            <a:endParaRPr lang="en-US" sz="1200" dirty="0"/>
+              <a:t>Método para encontrar un camino entre dos nodos</a:t>
+            </a:r>
           </a:p>
           <a:p>
             <a:pPr marL="800100" lvl="1" indent="-342900" fontAlgn="ctr">
@@ -3222,20 +3343,8 @@
             </a:pPr>
             <a:r>
               <a:rPr lang="es-ES" sz="1200" dirty="0"/>
-              <a:t>Poner todas las investigaciones relacionadas al tema de Visualización y Procesamiento de grafos en ambientes virtuales</a:t>
-            </a:r>
-            <a:endParaRPr lang="en-US" sz="1200" dirty="0"/>
-          </a:p>
-          <a:p>
-            <a:pPr marL="342900" indent="-342900" fontAlgn="ctr">
-              <a:buFont typeface="+mj-lt"/>
-              <a:buAutoNum type="arabicPeriod"/>
-            </a:pPr>
-            <a:r>
-              <a:rPr lang="es-ES" sz="1200" dirty="0"/>
-              <a:t>Capítulo 3: Marco Teórico</a:t>
-            </a:r>
-            <a:endParaRPr lang="en-US" sz="1200" dirty="0"/>
+              <a:t>Primera fase para ubicar circuitos que comuniquen sub-comunidades</a:t>
+            </a:r>
           </a:p>
           <a:p>
             <a:pPr marL="800100" lvl="1" indent="-342900" fontAlgn="ctr">
@@ -3244,178 +3353,14 @@
             </a:pPr>
             <a:r>
               <a:rPr lang="es-ES" sz="1200" dirty="0"/>
-              <a:t>Poner las distintas herramientas que vamos a </a:t>
-            </a:r>
-            <a:r>
-              <a:rPr lang="es-ES" sz="1200" dirty="0" smtClean="0"/>
-              <a:t>utilizar</a:t>
-            </a:r>
-          </a:p>
-          <a:p>
-            <a:pPr lvl="2" fontAlgn="ctr"/>
-            <a:endParaRPr lang="en-US" sz="1200" dirty="0"/>
-          </a:p>
-          <a:p>
-            <a:r>
-              <a:rPr lang="es-ES" sz="1200" dirty="0"/>
-              <a:t>Proyecto</a:t>
-            </a:r>
-            <a:endParaRPr lang="en-US" sz="1200" dirty="0"/>
-          </a:p>
-          <a:p>
-            <a:r>
-              <a:rPr lang="es-ES" sz="1200" dirty="0"/>
-              <a:t>Fase 1: Generación del grafo</a:t>
-            </a:r>
-            <a:endParaRPr lang="en-US" sz="1200" dirty="0"/>
-          </a:p>
-          <a:p>
-            <a:pPr marL="342900" indent="-342900" fontAlgn="ctr">
-              <a:buFont typeface="+mj-lt"/>
-              <a:buAutoNum type="arabicPeriod"/>
-            </a:pPr>
-            <a:r>
-              <a:rPr lang="es-ES" sz="1200" dirty="0"/>
-              <a:t>Pasar la información del JSON a la base de datos</a:t>
-            </a:r>
-            <a:endParaRPr lang="en-US" sz="1200" dirty="0"/>
+              <a:t>Primera fase de filtros (por definir)</a:t>
+            </a:r>
           </a:p>
           <a:p>
             <a:pPr marL="800100" lvl="1" indent="-342900" fontAlgn="ctr">
-              <a:buFont typeface="+mj-lt"/>
-              <a:buAutoNum type="arabicPeriod"/>
-            </a:pPr>
-            <a:r>
-              <a:rPr lang="es-ES" sz="1200" dirty="0"/>
-              <a:t>Crear método para pasar la información de </a:t>
-            </a:r>
-            <a:r>
-              <a:rPr lang="es-ES" sz="1200" dirty="0" err="1"/>
-              <a:t>Thoth</a:t>
-            </a:r>
-            <a:r>
-              <a:rPr lang="es-ES" sz="1200" dirty="0"/>
-              <a:t> a NeoJ4</a:t>
-            </a:r>
-            <a:endParaRPr lang="en-US" sz="1200" dirty="0"/>
-          </a:p>
-          <a:p>
-            <a:pPr marL="800100" lvl="1" indent="-342900" fontAlgn="ctr">
-              <a:buFont typeface="+mj-lt"/>
-              <a:buAutoNum type="arabicPeriod"/>
-            </a:pPr>
-            <a:r>
-              <a:rPr lang="es-ES" sz="1200" dirty="0"/>
-              <a:t>Realizar el método para procesar los </a:t>
-            </a:r>
-            <a:r>
-              <a:rPr lang="es-ES" sz="1200" dirty="0" err="1"/>
-              <a:t>queries</a:t>
-            </a:r>
-            <a:r>
-              <a:rPr lang="es-ES" sz="1200" dirty="0"/>
-              <a:t> de NeoJ4</a:t>
-            </a:r>
-            <a:endParaRPr lang="en-US" sz="1200" dirty="0"/>
-          </a:p>
-          <a:p>
-            <a:pPr marL="342900" indent="-342900" fontAlgn="ctr">
-              <a:buFont typeface="+mj-lt"/>
-              <a:buAutoNum type="arabicPeriod"/>
-            </a:pPr>
-            <a:r>
-              <a:rPr lang="es-ES" sz="1200" dirty="0"/>
-              <a:t>Generar los componentes básicos</a:t>
-            </a:r>
-            <a:endParaRPr lang="en-US" sz="1200" dirty="0"/>
-          </a:p>
-          <a:p>
-            <a:pPr marL="800100" lvl="1" indent="-342900" fontAlgn="ctr">
-              <a:buFont typeface="+mj-lt"/>
-              <a:buAutoNum type="arabicPeriod"/>
-            </a:pPr>
-            <a:r>
-              <a:rPr lang="es-ES" sz="1200" dirty="0"/>
-              <a:t>Tener la clase tipo Nodo</a:t>
-            </a:r>
-            <a:endParaRPr lang="en-US" sz="1200" dirty="0"/>
-          </a:p>
-          <a:p>
-            <a:pPr marL="800100" lvl="1" indent="-342900" fontAlgn="ctr">
-              <a:buFont typeface="+mj-lt"/>
-              <a:buAutoNum type="arabicPeriod"/>
-            </a:pPr>
-            <a:r>
-              <a:rPr lang="es-ES" sz="1200" dirty="0"/>
-              <a:t>Tener la clase tipo Arista</a:t>
-            </a:r>
-            <a:endParaRPr lang="en-US" sz="1200" dirty="0"/>
-          </a:p>
-          <a:p>
-            <a:pPr marL="800100" lvl="1" indent="-342900" fontAlgn="ctr">
-              <a:buFont typeface="+mj-lt"/>
-              <a:buAutoNum type="arabicPeriod"/>
-            </a:pPr>
-            <a:r>
-              <a:rPr lang="es-ES" sz="1200" dirty="0"/>
-              <a:t>Crear la estructura que maneja la matriz de adyacencia</a:t>
-            </a:r>
-            <a:endParaRPr lang="en-US" sz="1200" dirty="0"/>
-          </a:p>
-          <a:p>
-            <a:pPr marL="800100" lvl="1" indent="-342900" fontAlgn="ctr">
-              <a:buFont typeface="+mj-lt"/>
-              <a:buAutoNum type="arabicPeriod"/>
-            </a:pPr>
-            <a:r>
-              <a:rPr lang="es-ES" sz="1200" dirty="0"/>
-              <a:t>Crear una estructura de datos que manejo el grafo como tal</a:t>
-            </a:r>
-            <a:endParaRPr lang="en-US" sz="1200" dirty="0"/>
-          </a:p>
-          <a:p>
-            <a:pPr marL="342900" indent="-342900" fontAlgn="ctr">
-              <a:buFont typeface="+mj-lt"/>
-              <a:buAutoNum type="arabicPeriod"/>
-            </a:pPr>
-            <a:r>
-              <a:rPr lang="es-ES" sz="1200" dirty="0"/>
-              <a:t>Hacer la interacción básica entre módulos</a:t>
-            </a:r>
-            <a:endParaRPr lang="en-US" sz="1200" dirty="0"/>
-          </a:p>
-          <a:p>
-            <a:pPr marL="800100" lvl="1" indent="-342900" fontAlgn="ctr">
-              <a:buFont typeface="+mj-lt"/>
-              <a:buAutoNum type="arabicPeriod"/>
-            </a:pPr>
-            <a:r>
-              <a:rPr lang="es-ES" sz="1200" dirty="0"/>
-              <a:t>Realizar el método para regresar todos los nodos encontrados</a:t>
-            </a:r>
-            <a:endParaRPr lang="en-US" sz="1200" dirty="0"/>
-          </a:p>
-          <a:p>
-            <a:pPr marL="800100" lvl="1" indent="-342900" fontAlgn="ctr">
-              <a:buFont typeface="+mj-lt"/>
-              <a:buAutoNum type="arabicPeriod"/>
-            </a:pPr>
-            <a:r>
-              <a:rPr lang="es-ES" sz="1200" dirty="0"/>
-              <a:t>Tener una forma de regresar únicamente las relaciones</a:t>
-            </a:r>
-            <a:endParaRPr lang="en-US" sz="1200" dirty="0"/>
-          </a:p>
-          <a:p>
-            <a:pPr marL="800100" lvl="1" indent="-342900" fontAlgn="ctr">
-              <a:buFont typeface="+mj-lt"/>
-              <a:buAutoNum type="arabicPeriod"/>
-            </a:pPr>
-            <a:r>
-              <a:rPr lang="es-ES" sz="1200" dirty="0"/>
-              <a:t>Poder regresar todo el grafo</a:t>
-            </a:r>
-            <a:endParaRPr lang="en-US" sz="1200" dirty="0"/>
+              <a:buAutoNum type="arabicPeriod"/>
+            </a:pPr>
+            <a:endParaRPr lang="es-ES" sz="1200" dirty="0"/>
           </a:p>
         </p:txBody>
       </p:sp>
@@ -3427,7 +3372,7 @@
         </p:nvSpPr>
         <p:spPr>
           <a:xfrm>
-            <a:off x="4646439" y="1126155"/>
+            <a:off x="3874279" y="-8385"/>
             <a:ext cx="1367555" cy="416466"/>
           </a:xfrm>
           <a:prstGeom prst="rect">
@@ -3456,18 +3401,13 @@
           <a:p>
             <a:pPr algn="ctr"/>
             <a:r>
-              <a:rPr lang="en-US" dirty="0" smtClean="0">
+              <a:rPr lang="es-ES">
                 <a:solidFill>
                   <a:schemeClr val="bg1"/>
                 </a:solidFill>
               </a:rPr>
               <a:t>IDI 2</a:t>
             </a:r>
-            <a:endParaRPr lang="en-US" dirty="0">
-              <a:solidFill>
-                <a:schemeClr val="bg1"/>
-              </a:solidFill>
-            </a:endParaRPr>
           </a:p>
         </p:txBody>
       </p:sp>
@@ -3479,8 +3419,8 @@
         </p:nvSpPr>
         <p:spPr>
           <a:xfrm>
-            <a:off x="7197691" y="1864490"/>
-            <a:ext cx="3590957" cy="8032968"/>
+            <a:off x="6430246" y="568832"/>
+            <a:ext cx="3590957" cy="7663636"/>
           </a:xfrm>
           <a:prstGeom prst="rect">
             <a:avLst/>
@@ -3512,7 +3452,6 @@
               <a:rPr lang="es-ES" sz="1200" dirty="0"/>
               <a:t>TOG</a:t>
             </a:r>
-            <a:endParaRPr lang="en-US" sz="1200" dirty="0"/>
           </a:p>
           <a:p>
             <a:pPr marL="342900" indent="-342900" fontAlgn="ctr">
@@ -3521,9 +3460,28 @@
             </a:pPr>
             <a:r>
               <a:rPr lang="es-ES" sz="1200" dirty="0"/>
-              <a:t>Capítulo 2: Estado del arte </a:t>
-            </a:r>
-            <a:endParaRPr lang="en-US" sz="1200" dirty="0"/>
+              <a:t>Capítulo 2: Estado del arte </a:t>
+            </a:r>
+          </a:p>
+          <a:p>
+            <a:pPr marL="342900" indent="-342900" fontAlgn="ctr">
+              <a:buFont typeface="+mj-lt"/>
+              <a:buAutoNum type="arabicPeriod"/>
+            </a:pPr>
+            <a:r>
+              <a:rPr lang="es-ES" sz="1200" dirty="0"/>
+              <a:t>Capítulo 3: Marco Teórico</a:t>
+            </a:r>
+          </a:p>
+          <a:p>
+            <a:pPr marL="342900" indent="-342900" fontAlgn="ctr">
+              <a:buFont typeface="+mj-lt"/>
+              <a:buAutoNum type="arabicPeriod"/>
+            </a:pPr>
+            <a:r>
+              <a:rPr lang="es-ES" sz="1200" dirty="0"/>
+              <a:t>Capítulo 4: Desarrollo metodológico</a:t>
+            </a:r>
           </a:p>
           <a:p>
             <a:pPr marL="800100" lvl="1" indent="-342900" fontAlgn="ctr">
@@ -3532,9 +3490,94 @@
             </a:pPr>
             <a:r>
               <a:rPr lang="es-ES" sz="1200" dirty="0"/>
-              <a:t>Actualizar y mejorar en base a retroalimentación</a:t>
-            </a:r>
-            <a:endParaRPr lang="en-US" sz="1200" dirty="0"/>
+              <a:t>Requerimientos</a:t>
+            </a:r>
+          </a:p>
+          <a:p>
+            <a:pPr marL="800100" lvl="1" indent="-342900" fontAlgn="ctr">
+              <a:buFont typeface="+mj-lt"/>
+              <a:buAutoNum type="arabicPeriod"/>
+            </a:pPr>
+            <a:r>
+              <a:rPr lang="es-ES" sz="1200" dirty="0"/>
+              <a:t>Diseño y propuesta del sistema</a:t>
+            </a:r>
+          </a:p>
+          <a:p>
+            <a:pPr marL="800100" lvl="1" indent="-342900" fontAlgn="ctr">
+              <a:buFont typeface="+mj-lt"/>
+              <a:buAutoNum type="arabicPeriod"/>
+            </a:pPr>
+            <a:r>
+              <a:rPr lang="es-ES" sz="1200" dirty="0"/>
+              <a:t>Diseño y análisis a priori de los algoritmos</a:t>
+            </a:r>
+          </a:p>
+          <a:p>
+            <a:pPr marL="800100" lvl="1" indent="-342900" fontAlgn="ctr">
+              <a:buFont typeface="+mj-lt"/>
+              <a:buAutoNum type="arabicPeriod"/>
+            </a:pPr>
+            <a:r>
+              <a:rPr lang="es-ES" sz="1200" dirty="0"/>
+              <a:t>Análisis de algoritmo para reconocer usuarios tipo bot dentro de las comunidades</a:t>
+            </a:r>
+          </a:p>
+          <a:p>
+            <a:pPr marL="800100" lvl="1" indent="-342900" fontAlgn="ctr">
+              <a:buFont typeface="+mj-lt"/>
+              <a:buAutoNum type="arabicPeriod"/>
+            </a:pPr>
+            <a:r>
+              <a:rPr lang="es-ES" sz="1200" dirty="0"/>
+              <a:t>Validación a posteriori del algoritmo para reconocer usuarios tipo bot dentro de las comunidades</a:t>
+            </a:r>
+          </a:p>
+          <a:p>
+            <a:pPr marL="800100" lvl="1" indent="-342900" fontAlgn="ctr">
+              <a:buFont typeface="+mj-lt"/>
+              <a:buAutoNum type="arabicPeriod"/>
+            </a:pPr>
+            <a:r>
+              <a:rPr lang="es-ES" sz="1200" dirty="0"/>
+              <a:t>Análisis de algoritmo para reconocer emociones en Tweets</a:t>
+            </a:r>
+          </a:p>
+          <a:p>
+            <a:pPr marL="800100" lvl="1" indent="-342900" fontAlgn="ctr">
+              <a:buFont typeface="+mj-lt"/>
+              <a:buAutoNum type="arabicPeriod"/>
+            </a:pPr>
+            <a:r>
+              <a:rPr lang="es-ES" sz="1200" dirty="0"/>
+              <a:t>Validación a posteriori del algoritmo para reconocer emociones en Tweets</a:t>
+            </a:r>
+          </a:p>
+          <a:p>
+            <a:pPr marL="800100" lvl="1" indent="-342900" fontAlgn="ctr">
+              <a:buFont typeface="+mj-lt"/>
+              <a:buAutoNum type="arabicPeriod"/>
+            </a:pPr>
+            <a:r>
+              <a:rPr lang="es-ES" sz="1200" dirty="0"/>
+              <a:t>Análisis de algoritmo para reconocer patrones dentro de comunidades</a:t>
+            </a:r>
+          </a:p>
+          <a:p>
+            <a:pPr marL="800100" lvl="1" indent="-342900" fontAlgn="ctr">
+              <a:buFont typeface="+mj-lt"/>
+              <a:buAutoNum type="arabicPeriod"/>
+            </a:pPr>
+            <a:r>
+              <a:rPr lang="es-ES" sz="1200" dirty="0"/>
+              <a:t>Validación a posteriori del algoritmo para reconocer patrones dentro de comunidades</a:t>
+            </a:r>
+          </a:p>
+          <a:p>
+            <a:r>
+              <a:rPr lang="es-ES" sz="1200" dirty="0"/>
+              <a:t>Proyecto</a:t>
+            </a:r>
           </a:p>
           <a:p>
             <a:pPr marL="342900" indent="-342900" fontAlgn="ctr">
@@ -3543,9 +3586,8 @@
             </a:pPr>
             <a:r>
               <a:rPr lang="es-ES" sz="1200" dirty="0"/>
-              <a:t>Capítulo 3: Marco Teórico</a:t>
-            </a:r>
-            <a:endParaRPr lang="en-US" sz="1200" dirty="0"/>
+              <a:t>Comprensión matemática</a:t>
+            </a:r>
           </a:p>
           <a:p>
             <a:pPr marL="800100" lvl="1" indent="-342900" fontAlgn="ctr">
@@ -3554,9 +3596,48 @@
             </a:pPr>
             <a:r>
               <a:rPr lang="es-ES" sz="1200" dirty="0"/>
-              <a:t>Actualizar y mejorar en base a retroalimentación</a:t>
-            </a:r>
-            <a:endParaRPr lang="en-US" sz="1200" dirty="0"/>
+              <a:t>Crear los métodos para las siguientes operaciones:</a:t>
+            </a:r>
+          </a:p>
+          <a:p>
+            <a:pPr marL="1257300" lvl="2" indent="-342900" fontAlgn="ctr">
+              <a:buFont typeface="+mj-lt"/>
+              <a:buAutoNum type="arabicPeriod"/>
+            </a:pPr>
+            <a:r>
+              <a:rPr lang="es-ES" sz="1200" dirty="0"/>
+              <a:t>Longitud del grafo</a:t>
+            </a:r>
+          </a:p>
+          <a:p>
+            <a:pPr marL="1257300" lvl="2" indent="-342900" fontAlgn="ctr">
+              <a:buFont typeface="+mj-lt"/>
+              <a:buAutoNum type="arabicPeriod"/>
+            </a:pPr>
+            <a:r>
+              <a:rPr lang="es-ES" sz="1200" dirty="0"/>
+              <a:t>Diámetro del grafo</a:t>
+            </a:r>
+          </a:p>
+          <a:p>
+            <a:pPr marL="1257300" lvl="2" indent="-342900" fontAlgn="ctr">
+              <a:buFont typeface="+mj-lt"/>
+              <a:buAutoNum type="arabicPeriod"/>
+            </a:pPr>
+            <a:r>
+              <a:rPr lang="es-ES" sz="1200" dirty="0"/>
+              <a:t>Grado de los nodos</a:t>
+            </a:r>
+          </a:p>
+          <a:p>
+            <a:pPr marL="1257300" lvl="2" indent="-342900" fontAlgn="ctr">
+              <a:buFont typeface="+mj-lt"/>
+              <a:buAutoNum type="arabicPeriod"/>
+            </a:pPr>
+            <a:r>
+              <a:rPr lang="es-ES" sz="1200" dirty="0"/>
+              <a:t>Densidad de los nodos</a:t>
+            </a:r>
           </a:p>
           <a:p>
             <a:pPr marL="342900" indent="-342900" fontAlgn="ctr">
@@ -3565,9 +3646,8 @@
             </a:pPr>
             <a:r>
               <a:rPr lang="es-ES" sz="1200" dirty="0"/>
-              <a:t>Capítulo 4: Desarrollo metodológico</a:t>
-            </a:r>
-            <a:endParaRPr lang="en-US" sz="1200" dirty="0"/>
+              <a:t>Filtros avanzados</a:t>
+            </a:r>
           </a:p>
           <a:p>
             <a:pPr marL="800100" lvl="1" indent="-342900" fontAlgn="ctr">
@@ -3576,13 +3656,8 @@
             </a:pPr>
             <a:r>
               <a:rPr lang="es-ES" sz="1200" dirty="0"/>
-              <a:t>Tema 1: Propuesta de algoritmo de búsqueda en grafos de dimensiones </a:t>
-            </a:r>
-            <a:r>
-              <a:rPr lang="es-ES" sz="1200" dirty="0" err="1"/>
-              <a:t>MxNxO</a:t>
-            </a:r>
-            <a:endParaRPr lang="en-US" sz="1200" dirty="0"/>
+              <a:t>Método para generar sub-comunidades</a:t>
+            </a:r>
           </a:p>
           <a:p>
             <a:pPr marL="800100" lvl="1" indent="-342900" fontAlgn="ctr">
@@ -3591,9 +3666,8 @@
             </a:pPr>
             <a:r>
               <a:rPr lang="es-ES" sz="1200" dirty="0"/>
-              <a:t>Tema 2: Propuesta de algoritmo para reconocer sub-comunidades dentro de un conjunto</a:t>
-            </a:r>
-            <a:endParaRPr lang="en-US" sz="1200" dirty="0"/>
+              <a:t>Método para generar sub-comunidades en base a criterios y filtros</a:t>
+            </a:r>
           </a:p>
           <a:p>
             <a:pPr marL="800100" lvl="1" indent="-342900" fontAlgn="ctr">
@@ -3602,17 +3676,18 @@
             </a:pPr>
             <a:r>
               <a:rPr lang="es-ES" sz="1200" dirty="0"/>
-              <a:t>Tema 3: Propuesta de algoritmo para encontrar patrones (reconocer a usuarios </a:t>
-            </a:r>
-            <a:r>
-              <a:rPr lang="es-ES" sz="1200" dirty="0" err="1"/>
-              <a:t>bots</a:t>
-            </a:r>
-            <a:r>
-              <a:rPr lang="es-ES" sz="1200" dirty="0"/>
-              <a:t> y movimiento de usuarios)</a:t>
-            </a:r>
-            <a:endParaRPr lang="en-US" sz="1200" dirty="0"/>
+              <a:t>Procesar filtros avanzados (por definir)</a:t>
+            </a:r>
+          </a:p>
+          <a:p>
+            <a:pPr marL="342900" indent="-342900" fontAlgn="ctr">
+              <a:buFont typeface="+mj-lt"/>
+              <a:buAutoNum type="arabicPeriod"/>
+            </a:pPr>
+            <a:r>
+              <a:rPr lang="es-ES" sz="1200" dirty="0"/>
+              <a:t>Análisis avanzado (parte dos)</a:t>
+            </a:r>
           </a:p>
           <a:p>
             <a:pPr marL="800100" lvl="1" indent="-342900" fontAlgn="ctr">
@@ -3621,34 +3696,8 @@
             </a:pPr>
             <a:r>
               <a:rPr lang="es-ES" sz="1200" dirty="0"/>
-              <a:t>Tema 4: Reconocimiento y entendimiento básico de sentimientos (felicidad, enojo y tristeza)</a:t>
-            </a:r>
-            <a:endParaRPr lang="en-US" sz="1200" dirty="0"/>
-          </a:p>
-          <a:p>
-            <a:r>
-              <a:rPr lang="es-ES" sz="1200" dirty="0"/>
-              <a:t>Proyecto</a:t>
-            </a:r>
-            <a:endParaRPr lang="en-US" sz="1200" dirty="0"/>
-          </a:p>
-          <a:p>
-            <a:r>
-              <a:rPr lang="es-ES" sz="1200" dirty="0"/>
-              <a:t>Fase 2: Interacción y operaciones básicas</a:t>
-            </a:r>
-            <a:endParaRPr lang="en-US" sz="1200" dirty="0"/>
-          </a:p>
-          <a:p>
-            <a:pPr marL="342900" indent="-342900" fontAlgn="ctr">
-              <a:buFont typeface="+mj-lt"/>
-              <a:buAutoNum type="arabicPeriod"/>
-            </a:pPr>
-            <a:r>
-              <a:rPr lang="es-ES" sz="1200" dirty="0"/>
-              <a:t>Operaciones básicas</a:t>
-            </a:r>
-            <a:endParaRPr lang="en-US" sz="1200" dirty="0"/>
+              <a:t>Métodos para reconocer patrones en automático (ML/DL)</a:t>
+            </a:r>
           </a:p>
           <a:p>
             <a:pPr marL="800100" lvl="1" indent="-342900" fontAlgn="ctr">
@@ -3657,153 +3706,8 @@
             </a:pPr>
             <a:r>
               <a:rPr lang="es-ES" sz="1200" dirty="0"/>
-              <a:t>Crear los métodos para las siguientes operaciones:</a:t>
-            </a:r>
-            <a:endParaRPr lang="en-US" sz="1200" dirty="0"/>
-          </a:p>
-          <a:p>
-            <a:pPr marL="1257300" lvl="2" indent="-342900" fontAlgn="ctr">
-              <a:buFont typeface="+mj-lt"/>
-              <a:buAutoNum type="arabicPeriod"/>
-            </a:pPr>
-            <a:r>
-              <a:rPr lang="es-ES" sz="1200" dirty="0"/>
-              <a:t>Longitud del grafo</a:t>
-            </a:r>
-            <a:endParaRPr lang="en-US" sz="1200" dirty="0"/>
-          </a:p>
-          <a:p>
-            <a:pPr marL="1257300" lvl="2" indent="-342900" fontAlgn="ctr">
-              <a:buFont typeface="+mj-lt"/>
-              <a:buAutoNum type="arabicPeriod"/>
-            </a:pPr>
-            <a:r>
-              <a:rPr lang="es-ES" sz="1200" dirty="0"/>
-              <a:t>Diámetro del grafo</a:t>
-            </a:r>
-            <a:endParaRPr lang="en-US" sz="1200" dirty="0"/>
-          </a:p>
-          <a:p>
-            <a:pPr marL="1257300" lvl="2" indent="-342900" fontAlgn="ctr">
-              <a:buFont typeface="+mj-lt"/>
-              <a:buAutoNum type="arabicPeriod"/>
-            </a:pPr>
-            <a:r>
-              <a:rPr lang="es-ES" sz="1200" dirty="0"/>
-              <a:t>Grado de los nodos</a:t>
-            </a:r>
-            <a:endParaRPr lang="en-US" sz="1200" dirty="0"/>
-          </a:p>
-          <a:p>
-            <a:pPr marL="1257300" lvl="2" indent="-342900" fontAlgn="ctr">
-              <a:buFont typeface="+mj-lt"/>
-              <a:buAutoNum type="arabicPeriod"/>
-            </a:pPr>
-            <a:r>
-              <a:rPr lang="es-ES" sz="1200" dirty="0"/>
-              <a:t>Densidad de los nodos</a:t>
-            </a:r>
-            <a:endParaRPr lang="en-US" sz="1200" dirty="0"/>
-          </a:p>
-          <a:p>
-            <a:pPr marL="800100" lvl="1" indent="-342900" fontAlgn="ctr">
-              <a:buFont typeface="+mj-lt"/>
-              <a:buAutoNum type="arabicPeriod"/>
-            </a:pPr>
-            <a:r>
-              <a:rPr lang="es-ES" sz="1200" dirty="0"/>
-              <a:t>Primera fase de encontrar sub-comunidades</a:t>
-            </a:r>
-            <a:endParaRPr lang="en-US" sz="1200" dirty="0"/>
-          </a:p>
-          <a:p>
-            <a:pPr marL="342900" indent="-342900" fontAlgn="ctr">
-              <a:buFont typeface="+mj-lt"/>
-              <a:buAutoNum type="arabicPeriod"/>
-            </a:pPr>
-            <a:r>
-              <a:rPr lang="es-ES" sz="1200" dirty="0"/>
-              <a:t>Interacción</a:t>
-            </a:r>
-            <a:endParaRPr lang="en-US" sz="1200" dirty="0"/>
-          </a:p>
-          <a:p>
-            <a:pPr marL="800100" lvl="1" indent="-342900" fontAlgn="ctr">
-              <a:buFont typeface="+mj-lt"/>
-              <a:buAutoNum type="arabicPeriod"/>
-            </a:pPr>
-            <a:r>
-              <a:rPr lang="es-ES" sz="1200" dirty="0"/>
-              <a:t>Método para encontrar un camino entre dos nodos</a:t>
-            </a:r>
-            <a:endParaRPr lang="en-US" sz="1200" dirty="0"/>
-          </a:p>
-          <a:p>
-            <a:pPr marL="800100" lvl="1" indent="-342900" fontAlgn="ctr">
-              <a:buFont typeface="+mj-lt"/>
-              <a:buAutoNum type="arabicPeriod"/>
-            </a:pPr>
-            <a:r>
-              <a:rPr lang="es-ES" sz="1200" dirty="0"/>
-              <a:t>Primera fase para ubicar circuitos que comuniquen sub-comunidades</a:t>
-            </a:r>
-            <a:endParaRPr lang="en-US" sz="1200" dirty="0"/>
-          </a:p>
-          <a:p>
-            <a:pPr marL="800100" lvl="1" indent="-342900" fontAlgn="ctr">
-              <a:buFont typeface="+mj-lt"/>
-              <a:buAutoNum type="arabicPeriod"/>
-            </a:pPr>
-            <a:r>
-              <a:rPr lang="es-ES" sz="1200" dirty="0"/>
-              <a:t>Primera fase de filtros (por definir)</a:t>
-            </a:r>
-            <a:endParaRPr lang="en-US" sz="1200" dirty="0"/>
-          </a:p>
-          <a:p>
-            <a:pPr marL="342900" indent="-342900" fontAlgn="ctr">
-              <a:buFont typeface="+mj-lt"/>
-              <a:buAutoNum type="arabicPeriod"/>
-            </a:pPr>
-            <a:r>
-              <a:rPr lang="es-ES" sz="1200" dirty="0" err="1"/>
-              <a:t>Nice</a:t>
-            </a:r>
-            <a:r>
-              <a:rPr lang="es-ES" sz="1200" dirty="0"/>
-              <a:t> to </a:t>
-            </a:r>
-            <a:r>
-              <a:rPr lang="es-ES" sz="1200" dirty="0" err="1"/>
-              <a:t>have</a:t>
-            </a:r>
-            <a:endParaRPr lang="en-US" sz="1200" dirty="0"/>
-          </a:p>
-          <a:p>
-            <a:pPr marL="800100" lvl="1" indent="-342900" fontAlgn="ctr">
-              <a:buFont typeface="+mj-lt"/>
-              <a:buAutoNum type="arabicPeriod"/>
-            </a:pPr>
-            <a:r>
-              <a:rPr lang="es-ES" sz="1200" dirty="0"/>
-              <a:t>Método para relacionar una N cantidad de grafos (estaría por el momento topado a 3 grafos a la vez)</a:t>
-            </a:r>
-            <a:endParaRPr lang="en-US" sz="1200" dirty="0"/>
-          </a:p>
-          <a:p>
-            <a:pPr marL="800100" lvl="1" indent="-342900" fontAlgn="ctr">
-              <a:buFont typeface="+mj-lt"/>
-              <a:buAutoNum type="arabicPeriod"/>
-            </a:pPr>
-            <a:r>
-              <a:rPr lang="es-ES" sz="1200" dirty="0"/>
-              <a:t>Método para calcular la probabilidad de que un usuario sea un </a:t>
-            </a:r>
-            <a:r>
-              <a:rPr lang="es-ES" sz="1200" dirty="0" err="1"/>
-              <a:t>bot</a:t>
-            </a:r>
-            <a:endParaRPr lang="en-US" sz="1200" dirty="0"/>
+              <a:t>Algoritmo para reconocer sentimientos básicos (feliz, triste y enojado) y ponerle etiqueta a cada nodo/aristas</a:t>
+            </a:r>
           </a:p>
         </p:txBody>
       </p:sp>
@@ -3815,7 +3719,7 @@
         </p:nvSpPr>
         <p:spPr>
           <a:xfrm>
-            <a:off x="8309391" y="1126155"/>
+            <a:off x="7537231" y="-8385"/>
             <a:ext cx="1367555" cy="416466"/>
           </a:xfrm>
           <a:prstGeom prst="rect">
@@ -3844,18 +3748,13 @@
           <a:p>
             <a:pPr algn="ctr"/>
             <a:r>
-              <a:rPr lang="en-US" dirty="0" smtClean="0">
+              <a:rPr lang="es-ES">
                 <a:solidFill>
                   <a:schemeClr val="bg1"/>
                 </a:solidFill>
               </a:rPr>
               <a:t>IDI 3</a:t>
             </a:r>
-            <a:endParaRPr lang="en-US" dirty="0">
-              <a:solidFill>
-                <a:schemeClr val="bg1"/>
-              </a:solidFill>
-            </a:endParaRPr>
           </a:p>
         </p:txBody>
       </p:sp>
@@ -3867,8 +3766,8 @@
         </p:nvSpPr>
         <p:spPr>
           <a:xfrm>
-            <a:off x="11128340" y="1864490"/>
-            <a:ext cx="3590957" cy="4708981"/>
+            <a:off x="10351417" y="567016"/>
+            <a:ext cx="3590957" cy="1754326"/>
           </a:xfrm>
           <a:prstGeom prst="rect">
             <a:avLst/>
@@ -3900,7 +3799,6 @@
               <a:rPr lang="es-ES" sz="1200" dirty="0"/>
               <a:t>TOG</a:t>
             </a:r>
-            <a:endParaRPr lang="en-US" sz="1200" dirty="0"/>
           </a:p>
           <a:p>
             <a:pPr marL="342900" indent="-342900" fontAlgn="ctr">
@@ -3911,18 +3809,6 @@
               <a:rPr lang="es-ES" sz="1200" dirty="0"/>
               <a:t>Capítulo 4: Desarrollo metodológico</a:t>
             </a:r>
-            <a:endParaRPr lang="en-US" sz="1200" dirty="0"/>
-          </a:p>
-          <a:p>
-            <a:pPr marL="800100" lvl="1" indent="-342900" fontAlgn="ctr">
-              <a:buFont typeface="+mj-lt"/>
-              <a:buAutoNum type="arabicPeriod"/>
-            </a:pPr>
-            <a:r>
-              <a:rPr lang="es-ES" sz="1200" dirty="0"/>
-              <a:t>Actualizar y mejorar en base a retroalimentación</a:t>
-            </a:r>
-            <a:endParaRPr lang="en-US" sz="1200" dirty="0"/>
           </a:p>
           <a:p>
             <a:pPr marL="342900" indent="-342900" fontAlgn="ctr">
@@ -3933,18 +3819,6 @@
               <a:rPr lang="es-ES" sz="1200" dirty="0"/>
               <a:t>Capítulo 5: Resultados y discusión</a:t>
             </a:r>
-            <a:endParaRPr lang="en-US" sz="1200" dirty="0"/>
-          </a:p>
-          <a:p>
-            <a:pPr marL="800100" lvl="1" indent="-342900" fontAlgn="ctr">
-              <a:buFont typeface="+mj-lt"/>
-              <a:buAutoNum type="arabicPeriod"/>
-            </a:pPr>
-            <a:r>
-              <a:rPr lang="es-ES" sz="1200" dirty="0"/>
-              <a:t>Poner todo comentario dado por el asesor</a:t>
-            </a:r>
-            <a:endParaRPr lang="en-US" sz="1200" dirty="0"/>
           </a:p>
           <a:p>
             <a:pPr marL="342900" indent="-342900" fontAlgn="ctr">
@@ -3953,11 +3827,7 @@
             </a:pPr>
             <a:r>
               <a:rPr lang="es-ES" sz="1200" dirty="0"/>
-              <a:t>Capítulo 6: </a:t>
-            </a:r>
-            <a:r>
-              <a:rPr lang="es-ES" sz="1200" dirty="0" smtClean="0"/>
-              <a:t>Conclusiones</a:t>
+              <a:t>Capítulo 6: Conclusiones</a:t>
             </a:r>
           </a:p>
           <a:p>
@@ -3965,21 +3835,13 @@
               <a:buFont typeface="+mj-lt"/>
               <a:buAutoNum type="arabicPeriod"/>
             </a:pPr>
-            <a:endParaRPr lang="en-US" sz="1200" dirty="0"/>
+            <a:endParaRPr lang="es-ES" sz="1200" dirty="0"/>
           </a:p>
           <a:p>
             <a:r>
               <a:rPr lang="es-ES" sz="1200" dirty="0"/>
               <a:t>Proyecto</a:t>
             </a:r>
-            <a:endParaRPr lang="en-US" sz="1200" dirty="0"/>
-          </a:p>
-          <a:p>
-            <a:r>
-              <a:rPr lang="es-ES" sz="1200" dirty="0"/>
-              <a:t>Fase 3: Operaciones avanzadas</a:t>
-            </a:r>
-            <a:endParaRPr lang="en-US" sz="1200" dirty="0"/>
           </a:p>
           <a:p>
             <a:pPr marL="342900" indent="-342900" fontAlgn="ctr">
@@ -3987,32 +3849,9 @@
               <a:buAutoNum type="arabicPeriod"/>
             </a:pPr>
             <a:r>
-              <a:rPr lang="es-ES" sz="1200" dirty="0"/>
-              <a:t>Operaciones</a:t>
-            </a:r>
-            <a:endParaRPr lang="en-US" sz="1200" dirty="0"/>
-          </a:p>
-          <a:p>
-            <a:pPr marL="800100" lvl="1" indent="-342900" fontAlgn="ctr">
-              <a:buFont typeface="+mj-lt"/>
-              <a:buAutoNum type="arabicPeriod"/>
-            </a:pPr>
-            <a:r>
-              <a:rPr lang="es-ES" sz="1200" dirty="0"/>
-              <a:t>Método para generar sub-comunidades</a:t>
-            </a:r>
-            <a:endParaRPr lang="en-US" sz="1200" dirty="0"/>
-          </a:p>
-          <a:p>
-            <a:pPr marL="800100" lvl="1" indent="-342900" fontAlgn="ctr">
-              <a:buFont typeface="+mj-lt"/>
-              <a:buAutoNum type="arabicPeriod"/>
-            </a:pPr>
-            <a:r>
-              <a:rPr lang="es-ES" sz="1200" dirty="0"/>
-              <a:t>Método para generar sub-comunidades en base a criterios y filtros</a:t>
-            </a:r>
-            <a:endParaRPr lang="en-US" sz="1200" dirty="0"/>
+              <a:rPr lang="en-US" sz="1200" dirty="0"/>
+              <a:t>Integración</a:t>
+            </a:r>
           </a:p>
           <a:p>
             <a:pPr marL="342900" indent="-342900" fontAlgn="ctr">
@@ -4020,73 +3859,20 @@
               <a:buAutoNum type="arabicPeriod"/>
             </a:pPr>
             <a:r>
-              <a:rPr lang="es-ES" sz="1200" dirty="0"/>
-              <a:t>Interacción</a:t>
-            </a:r>
-            <a:endParaRPr lang="en-US" sz="1200" dirty="0"/>
-          </a:p>
-          <a:p>
-            <a:pPr marL="800100" lvl="1" indent="-342900" fontAlgn="ctr">
-              <a:buFont typeface="+mj-lt"/>
-              <a:buAutoNum type="arabicPeriod"/>
-            </a:pPr>
-            <a:r>
-              <a:rPr lang="es-ES" sz="1200" dirty="0"/>
-              <a:t>Generación de caminos con criterios y filtros</a:t>
-            </a:r>
-            <a:endParaRPr lang="en-US" sz="1200" dirty="0"/>
-          </a:p>
-          <a:p>
-            <a:pPr marL="800100" lvl="1" indent="-342900" fontAlgn="ctr">
-              <a:buFont typeface="+mj-lt"/>
-              <a:buAutoNum type="arabicPeriod"/>
-            </a:pPr>
-            <a:r>
-              <a:rPr lang="es-ES" sz="1200" dirty="0"/>
-              <a:t>Procesar filtros avanzados (por definir)</a:t>
-            </a:r>
-            <a:endParaRPr lang="en-US" sz="1200" dirty="0"/>
+              <a:rPr lang="en-US" sz="1200" dirty="0"/>
+              <a:t>Pr</a:t>
+            </a:r>
+            <a:r>
+              <a:rPr lang="es-ES" sz="1200" dirty="0"/>
+              <a:t>uebas y validaciones</a:t>
+            </a:r>
           </a:p>
           <a:p>
             <a:pPr marL="342900" indent="-342900" fontAlgn="ctr">
               <a:buFont typeface="+mj-lt"/>
               <a:buAutoNum type="arabicPeriod"/>
             </a:pPr>
-            <a:r>
-              <a:rPr lang="es-ES" sz="1200" dirty="0" err="1"/>
-              <a:t>Nice</a:t>
-            </a:r>
-            <a:r>
-              <a:rPr lang="es-ES" sz="1200" dirty="0"/>
-              <a:t> to </a:t>
-            </a:r>
-            <a:r>
-              <a:rPr lang="es-ES" sz="1200" dirty="0" err="1"/>
-              <a:t>have</a:t>
-            </a:r>
-            <a:endParaRPr lang="en-US" sz="1200" dirty="0"/>
-          </a:p>
-          <a:p>
-            <a:pPr marL="800100" lvl="1" indent="-342900" fontAlgn="ctr">
-              <a:buFont typeface="+mj-lt"/>
-              <a:buAutoNum type="arabicPeriod"/>
-            </a:pPr>
-            <a:r>
-              <a:rPr lang="es-ES" sz="1200" dirty="0"/>
-              <a:t>Métodos para reconocer patrones en automático (ML/DL)</a:t>
-            </a:r>
-            <a:endParaRPr lang="en-US" sz="1200" dirty="0"/>
-          </a:p>
-          <a:p>
-            <a:pPr marL="800100" lvl="1" indent="-342900" fontAlgn="ctr">
-              <a:buFont typeface="+mj-lt"/>
-              <a:buAutoNum type="arabicPeriod"/>
-            </a:pPr>
-            <a:r>
-              <a:rPr lang="es-ES" sz="1200" dirty="0"/>
-              <a:t>Algoritmo para reconocer sentimientos básicos (feliz, triste y enojado) y ponerle etiqueta a cada nodo/arista</a:t>
-            </a:r>
-            <a:endParaRPr lang="en-US" sz="1200" dirty="0"/>
+            <a:endParaRPr lang="es-ES" sz="1200" dirty="0"/>
           </a:p>
         </p:txBody>
       </p:sp>
@@ -4098,7 +3884,7 @@
         </p:nvSpPr>
         <p:spPr>
           <a:xfrm>
-            <a:off x="12240040" y="1126154"/>
+            <a:off x="11467880" y="-8386"/>
             <a:ext cx="1367555" cy="416466"/>
           </a:xfrm>
           <a:prstGeom prst="rect">
@@ -4127,18 +3913,13 @@
           <a:p>
             <a:pPr algn="ctr"/>
             <a:r>
-              <a:rPr lang="en-US" dirty="0" smtClean="0">
+              <a:rPr lang="es-ES">
                 <a:solidFill>
                   <a:schemeClr val="bg1"/>
                 </a:solidFill>
               </a:rPr>
               <a:t>IDI 4</a:t>
             </a:r>
-            <a:endParaRPr lang="en-US" dirty="0">
-              <a:solidFill>
-                <a:schemeClr val="bg1"/>
-              </a:solidFill>
-            </a:endParaRPr>
           </a:p>
         </p:txBody>
       </p:sp>
@@ -4146,6 +3927,7 @@
         <p:nvCxnSpPr>
           <p:cNvPr id="18" name="Straight Arrow Connector 17"/>
           <p:cNvCxnSpPr>
+            <a:cxnSpLocks/>
             <a:stCxn id="4" idx="2"/>
             <a:endCxn id="5" idx="0"/>
           </p:cNvCxnSpPr>
@@ -4153,8 +3935,8 @@
         </p:nvCxnSpPr>
         <p:spPr>
           <a:xfrm rot="5400000">
-            <a:off x="4270526" y="-1907289"/>
-            <a:ext cx="321869" cy="5745018"/>
+            <a:off x="3364085" y="-3179342"/>
+            <a:ext cx="149296" cy="6186153"/>
           </a:xfrm>
           <a:prstGeom prst="bentConnector3">
             <a:avLst>
@@ -4191,8 +3973,8 @@
         </p:nvCxnSpPr>
         <p:spPr>
           <a:xfrm rot="5400000">
-            <a:off x="6156159" y="-21656"/>
-            <a:ext cx="321869" cy="1973752"/>
+            <a:off x="5468669" y="-1071526"/>
+            <a:ext cx="152529" cy="1973752"/>
           </a:xfrm>
           <a:prstGeom prst="bentConnector3">
             <a:avLst>
@@ -4229,8 +4011,8 @@
         </p:nvCxnSpPr>
         <p:spPr>
           <a:xfrm rot="16200000" flipH="1">
-            <a:off x="7987635" y="120620"/>
-            <a:ext cx="321869" cy="1689200"/>
+            <a:off x="7300145" y="-929250"/>
+            <a:ext cx="152529" cy="1689200"/>
           </a:xfrm>
           <a:prstGeom prst="bentConnector3">
             <a:avLst>
@@ -4267,8 +4049,8 @@
         </p:nvCxnSpPr>
         <p:spPr>
           <a:xfrm rot="16200000" flipH="1">
-            <a:off x="9952959" y="-1844705"/>
-            <a:ext cx="321868" cy="5619849"/>
+            <a:off x="9265469" y="-2894575"/>
+            <a:ext cx="152528" cy="5619849"/>
           </a:xfrm>
           <a:prstGeom prst="bentConnector3">
             <a:avLst>
@@ -4298,15 +4080,15 @@
         <p:nvCxnSpPr>
           <p:cNvPr id="29" name="Straight Arrow Connector 28"/>
           <p:cNvCxnSpPr>
+            <a:cxnSpLocks/>
             <a:stCxn id="5" idx="2"/>
-            <a:endCxn id="9" idx="0"/>
           </p:cNvCxnSpPr>
           <p:nvPr/>
         </p:nvCxnSpPr>
         <p:spPr>
           <a:xfrm>
-            <a:off x="1558951" y="1542620"/>
-            <a:ext cx="0" cy="323075"/>
+            <a:off x="345656" y="404847"/>
+            <a:ext cx="0" cy="407953"/>
           </a:xfrm>
           <a:prstGeom prst="straightConnector1">
             <a:avLst/>
@@ -4340,7 +4122,7 @@
         </p:nvCxnSpPr>
         <p:spPr>
           <a:xfrm flipH="1">
-            <a:off x="5330216" y="1542621"/>
+            <a:off x="4558056" y="408081"/>
             <a:ext cx="1" cy="321869"/>
           </a:xfrm>
           <a:prstGeom prst="straightConnector1">
@@ -4369,15 +4151,15 @@
         <p:nvCxnSpPr>
           <p:cNvPr id="34" name="Straight Arrow Connector 33"/>
           <p:cNvCxnSpPr>
+            <a:cxnSpLocks/>
             <a:stCxn id="14" idx="2"/>
-            <a:endCxn id="12" idx="0"/>
           </p:cNvCxnSpPr>
           <p:nvPr/>
         </p:nvCxnSpPr>
         <p:spPr>
           <a:xfrm>
-            <a:off x="8993169" y="1542621"/>
-            <a:ext cx="1" cy="321869"/>
+            <a:off x="8221009" y="408081"/>
+            <a:ext cx="0" cy="404719"/>
           </a:xfrm>
           <a:prstGeom prst="straightConnector1">
             <a:avLst/>
@@ -4405,15 +4187,15 @@
         <p:nvCxnSpPr>
           <p:cNvPr id="37" name="Straight Arrow Connector 36"/>
           <p:cNvCxnSpPr>
+            <a:cxnSpLocks/>
             <a:stCxn id="16" idx="2"/>
-            <a:endCxn id="15" idx="0"/>
           </p:cNvCxnSpPr>
           <p:nvPr/>
         </p:nvCxnSpPr>
         <p:spPr>
           <a:xfrm>
-            <a:off x="12923818" y="1542620"/>
-            <a:ext cx="1" cy="321870"/>
+            <a:off x="12151658" y="408080"/>
+            <a:ext cx="0" cy="616387"/>
           </a:xfrm>
           <a:prstGeom prst="straightConnector1">
             <a:avLst/>
@@ -4539,15 +4321,7 @@
             </a:r>
             <a:r>
               <a:rPr lang="es-ES" dirty="0"/>
-              <a:t> y regrese una estructura</a:t>
-            </a:r>
-            <a:r>
-              <a:rPr lang="es-ES" dirty="0" smtClean="0"/>
-              <a:t>)</a:t>
-            </a:r>
-            <a:r>
-              <a:rPr lang="es-ES" dirty="0"/>
-              <a:t> </a:t>
+              <a:t> y regrese una estructura) </a:t>
             </a:r>
           </a:p>
           <a:p>
@@ -4582,13 +4356,8 @@
             <a:pPr lvl="1" fontAlgn="ctr"/>
             <a:r>
               <a:rPr lang="es-ES" dirty="0"/>
-              <a:t>Una estructura que maneja el grafo como tal (compuesto de aristas o simplemente la matriz de adyacencia</a:t>
-            </a:r>
-            <a:r>
-              <a:rPr lang="es-ES" dirty="0" smtClean="0"/>
-              <a:t>)</a:t>
-            </a:r>
-            <a:endParaRPr lang="es-ES" dirty="0"/>
+              <a:t>Una estructura que maneja el grafo como tal (compuesto de aristas o simplemente la matriz de adyacencia)</a:t>
+            </a:r>
           </a:p>
           <a:p>
             <a:pPr fontAlgn="ctr"/>
@@ -4744,11 +4513,7 @@
             <a:pPr lvl="1" fontAlgn="ctr"/>
             <a:r>
               <a:rPr lang="es-ES" dirty="0"/>
-              <a:t>Primera fase de filtros (por definir</a:t>
-            </a:r>
-            <a:r>
-              <a:rPr lang="es-ES" dirty="0" smtClean="0"/>
-              <a:t>)</a:t>
+              <a:t>Primera fase de filtros (por definir)</a:t>
             </a:r>
           </a:p>
           <a:p>
@@ -4763,7 +4528,15 @@
             </a:r>
             <a:r>
               <a:rPr lang="es-ES" dirty="0"/>
-              <a:t> to </a:t>
+              <a:t> </a:t>
+            </a:r>
+            <a:r>
+              <a:rPr lang="es-ES" dirty="0" err="1"/>
+              <a:t>to</a:t>
+            </a:r>
+            <a:r>
+              <a:rPr lang="es-ES" dirty="0"/>
+              <a:t> </a:t>
             </a:r>
             <a:r>
               <a:rPr lang="es-ES" dirty="0" err="1"/>
@@ -4785,13 +4558,8 @@
             <a:pPr lvl="1" fontAlgn="ctr"/>
             <a:r>
               <a:rPr lang="es-ES" dirty="0"/>
-              <a:t>Métodos para calcular la probabilidad de que un usuario sea un </a:t>
-            </a:r>
-            <a:r>
-              <a:rPr lang="es-ES" dirty="0" err="1"/>
-              <a:t>bot</a:t>
-            </a:r>
-            <a:endParaRPr lang="es-ES" dirty="0"/>
+              <a:t>Métodos para calcular la probabilidad de que un usuario sea un bot</a:t>
+            </a:r>
           </a:p>
           <a:p>
             <a:endParaRPr lang="en-US" dirty="0"/>
@@ -4850,99 +4618,87 @@
           <a:p>
             <a:pPr fontAlgn="ctr"/>
             <a:r>
-              <a:rPr lang="es-ES" dirty="0"/>
+              <a:rPr lang="es-ES"/>
               <a:t>Operaciones</a:t>
             </a:r>
           </a:p>
           <a:p>
             <a:pPr lvl="1" fontAlgn="ctr"/>
             <a:r>
-              <a:rPr lang="es-ES" dirty="0"/>
+              <a:rPr lang="es-ES"/>
               <a:t>Generación de sub comunidades</a:t>
             </a:r>
           </a:p>
           <a:p>
             <a:pPr lvl="1" fontAlgn="ctr"/>
             <a:r>
-              <a:rPr lang="es-ES" dirty="0"/>
+              <a:rPr lang="es-ES"/>
               <a:t>Generación de sub-comunidades con criterio</a:t>
             </a:r>
           </a:p>
           <a:p>
-            <a:endParaRPr lang="es-ES" dirty="0"/>
+            <a:endParaRPr lang="es-ES"/>
           </a:p>
           <a:p>
             <a:pPr fontAlgn="ctr"/>
             <a:r>
-              <a:rPr lang="es-ES" dirty="0"/>
+              <a:rPr lang="es-ES"/>
               <a:t>Interacción</a:t>
             </a:r>
           </a:p>
           <a:p>
             <a:pPr lvl="1" fontAlgn="ctr"/>
             <a:r>
-              <a:rPr lang="es-ES" dirty="0"/>
+              <a:rPr lang="es-ES"/>
               <a:t>Generación de caminos con criterios</a:t>
             </a:r>
           </a:p>
           <a:p>
             <a:pPr lvl="1" fontAlgn="ctr"/>
             <a:r>
-              <a:rPr lang="es-ES" dirty="0"/>
-              <a:t>Procesar filtros avanzados (por definir</a:t>
-            </a:r>
-            <a:r>
-              <a:rPr lang="es-ES" dirty="0" smtClean="0"/>
-              <a:t>)</a:t>
-            </a:r>
-            <a:r>
-              <a:rPr lang="es-ES" dirty="0"/>
-              <a:t> </a:t>
+              <a:rPr lang="es-ES"/>
+              <a:t>Procesar filtros avanzados (por definir) </a:t>
             </a:r>
           </a:p>
           <a:p>
             <a:pPr fontAlgn="ctr"/>
-            <a:endParaRPr lang="es-ES" dirty="0" smtClean="0"/>
+            <a:endParaRPr lang="es-ES"/>
           </a:p>
           <a:p>
             <a:pPr fontAlgn="ctr"/>
             <a:r>
-              <a:rPr lang="es-ES" dirty="0" err="1" smtClean="0"/>
+              <a:rPr lang="es-ES" err="1"/>
               <a:t>Nice</a:t>
             </a:r>
             <a:r>
-              <a:rPr lang="es-ES" dirty="0" smtClean="0"/>
-              <a:t> </a:t>
-            </a:r>
-            <a:r>
-              <a:rPr lang="es-ES" dirty="0"/>
-              <a:t>to </a:t>
-            </a:r>
-            <a:r>
-              <a:rPr lang="es-ES" dirty="0" err="1"/>
+              <a:rPr lang="es-ES"/>
+              <a:t> to </a:t>
+            </a:r>
+            <a:r>
+              <a:rPr lang="es-ES" err="1"/>
               <a:t>have</a:t>
             </a:r>
             <a:r>
-              <a:rPr lang="es-ES" dirty="0"/>
+              <a:rPr lang="es-ES"/>
               <a:t>:</a:t>
             </a:r>
           </a:p>
           <a:p>
             <a:pPr lvl="1" fontAlgn="ctr"/>
             <a:r>
-              <a:rPr lang="es-ES" dirty="0"/>
+              <a:rPr lang="es-ES"/>
               <a:t>Métodos para reconocer patrones en automático (ML/DL)</a:t>
             </a:r>
           </a:p>
           <a:p>
             <a:pPr lvl="1" fontAlgn="ctr"/>
             <a:r>
-              <a:rPr lang="es-ES" dirty="0"/>
+              <a:rPr lang="es-ES"/>
               <a:t>Algoritmo para re-conocer sentimientos básicos (feliz, triste y enojado) y ponerle etiqueta a cada Nodo/Arista</a:t>
             </a:r>
           </a:p>
           <a:p>
-            <a:endParaRPr lang="en-US" dirty="0"/>
+            <a:endParaRPr lang="en-US"/>
           </a:p>
         </p:txBody>
       </p:sp>
@@ -5218,4 +4974,193 @@
     </a:ext>
   </a:extLst>
 </a:theme>
+</file>
+
+<file path=customXml/item1.xml><?xml version="1.0" encoding="utf-8"?>
+<ct:contentTypeSchema xmlns:ct="http://schemas.microsoft.com/office/2006/metadata/contentType" xmlns:ma="http://schemas.microsoft.com/office/2006/metadata/properties/metaAttributes" ct:_="" ma:_="" ma:contentTypeName="Documento" ma:contentTypeID="0x01010066637A2A7B050C4F955EB34FF539B89F" ma:contentTypeVersion="2" ma:contentTypeDescription="Crear nuevo documento." ma:contentTypeScope="" ma:versionID="a4f4682f4d4232949a37eb15fe79af4c">
+  <xsd:schema xmlns:xsd="http://www.w3.org/2001/XMLSchema" xmlns:xs="http://www.w3.org/2001/XMLSchema" xmlns:p="http://schemas.microsoft.com/office/2006/metadata/properties" xmlns:ns2="8e8715b1-4f74-49a5-a4ef-72274251f188" targetNamespace="http://schemas.microsoft.com/office/2006/metadata/properties" ma:root="true" ma:fieldsID="868eb3e0bcc51ee244ea906b083b0d86" ns2:_="">
+    <xsd:import namespace="8e8715b1-4f74-49a5-a4ef-72274251f188"/>
+    <xsd:element name="properties">
+      <xsd:complexType>
+        <xsd:sequence>
+          <xsd:element name="documentManagement">
+            <xsd:complexType>
+              <xsd:all>
+                <xsd:element ref="ns2:MediaServiceMetadata" minOccurs="0"/>
+                <xsd:element ref="ns2:MediaServiceFastMetadata" minOccurs="0"/>
+              </xsd:all>
+            </xsd:complexType>
+          </xsd:element>
+        </xsd:sequence>
+      </xsd:complexType>
+    </xsd:element>
+  </xsd:schema>
+  <xsd:schema xmlns:xsd="http://www.w3.org/2001/XMLSchema" xmlns:xs="http://www.w3.org/2001/XMLSchema" xmlns:dms="http://schemas.microsoft.com/office/2006/documentManagement/types" xmlns:pc="http://schemas.microsoft.com/office/infopath/2007/PartnerControls" targetNamespace="8e8715b1-4f74-49a5-a4ef-72274251f188" elementFormDefault="qualified">
+    <xsd:import namespace="http://schemas.microsoft.com/office/2006/documentManagement/types"/>
+    <xsd:import namespace="http://schemas.microsoft.com/office/infopath/2007/PartnerControls"/>
+    <xsd:element name="MediaServiceMetadata" ma:index="8" nillable="true" ma:displayName="MediaServiceMetadata" ma:description="" ma:hidden="true" ma:internalName="MediaServiceMetadata" ma:readOnly="true">
+      <xsd:simpleType>
+        <xsd:restriction base="dms:Note"/>
+      </xsd:simpleType>
+    </xsd:element>
+    <xsd:element name="MediaServiceFastMetadata" ma:index="9" nillable="true" ma:displayName="MediaServiceFastMetadata" ma:description="" ma:hidden="true" ma:internalName="MediaServiceFastMetadata" ma:readOnly="true">
+      <xsd:simpleType>
+        <xsd:restriction base="dms:Note"/>
+      </xsd:simpleType>
+    </xsd:element>
+  </xsd:schema>
+  <xsd:schema xmlns="http://schemas.openxmlformats.org/package/2006/metadata/core-properties" xmlns:xsd="http://www.w3.org/2001/XMLSchema" xmlns:xsi="http://www.w3.org/2001/XMLSchema-instance" xmlns:dc="http://purl.org/dc/elements/1.1/" xmlns:dcterms="http://purl.org/dc/terms/" xmlns:odoc="http://schemas.microsoft.com/internal/obd" targetNamespace="http://schemas.openxmlformats.org/package/2006/metadata/core-properties" elementFormDefault="qualified" attributeFormDefault="unqualified" blockDefault="#all">
+    <xsd:import namespace="http://purl.org/dc/elements/1.1/" schemaLocation="http://dublincore.org/schemas/xmls/qdc/2003/04/02/dc.xsd"/>
+    <xsd:import namespace="http://purl.org/dc/terms/" schemaLocation="http://dublincore.org/schemas/xmls/qdc/2003/04/02/dcterms.xsd"/>
+    <xsd:element name="coreProperties" type="CT_coreProperties"/>
+    <xsd:complexType name="CT_coreProperties">
+      <xsd:all>
+        <xsd:element ref="dc:creator" minOccurs="0" maxOccurs="1"/>
+        <xsd:element ref="dcterms:created" minOccurs="0" maxOccurs="1"/>
+        <xsd:element ref="dc:identifier" minOccurs="0" maxOccurs="1"/>
+        <xsd:element name="contentType" minOccurs="0" maxOccurs="1" type="xsd:string" ma:index="0" ma:displayName="Tipo de contenido"/>
+        <xsd:element ref="dc:title" minOccurs="0" maxOccurs="1" ma:index="4" ma:displayName="Título"/>
+        <xsd:element ref="dc:subject" minOccurs="0" maxOccurs="1"/>
+        <xsd:element ref="dc:description" minOccurs="0" maxOccurs="1"/>
+        <xsd:element name="keywords" minOccurs="0" maxOccurs="1" type="xsd:string"/>
+        <xsd:element ref="dc:language" minOccurs="0" maxOccurs="1"/>
+        <xsd:element name="category" minOccurs="0" maxOccurs="1" type="xsd:string"/>
+        <xsd:element name="version" minOccurs="0" maxOccurs="1" type="xsd:string"/>
+        <xsd:element name="revision" minOccurs="0" maxOccurs="1" type="xsd:string">
+          <xsd:annotation>
+            <xsd:documentation>
+                        This value indicates the number of saves or revisions. The application is responsible for updating this value after each revision.
+                    </xsd:documentation>
+          </xsd:annotation>
+        </xsd:element>
+        <xsd:element name="lastModifiedBy" minOccurs="0" maxOccurs="1" type="xsd:string"/>
+        <xsd:element ref="dcterms:modified" minOccurs="0" maxOccurs="1"/>
+        <xsd:element name="contentStatus" minOccurs="0" maxOccurs="1" type="xsd:string"/>
+      </xsd:all>
+    </xsd:complexType>
+  </xsd:schema>
+  <xs:schema xmlns:pc="http://schemas.microsoft.com/office/infopath/2007/PartnerControls" xmlns:xs="http://www.w3.org/2001/XMLSchema" targetNamespace="http://schemas.microsoft.com/office/infopath/2007/PartnerControls" elementFormDefault="qualified" attributeFormDefault="unqualified">
+    <xs:element name="Person">
+      <xs:complexType>
+        <xs:sequence>
+          <xs:element ref="pc:DisplayName" minOccurs="0"/>
+          <xs:element ref="pc:AccountId" minOccurs="0"/>
+          <xs:element ref="pc:AccountType" minOccurs="0"/>
+        </xs:sequence>
+      </xs:complexType>
+    </xs:element>
+    <xs:element name="DisplayName" type="xs:string"/>
+    <xs:element name="AccountId" type="xs:string"/>
+    <xs:element name="AccountType" type="xs:string"/>
+    <xs:element name="BDCAssociatedEntity">
+      <xs:complexType>
+        <xs:sequence>
+          <xs:element ref="pc:BDCEntity" minOccurs="0" maxOccurs="unbounded"/>
+        </xs:sequence>
+        <xs:attribute ref="pc:EntityNamespace"/>
+        <xs:attribute ref="pc:EntityName"/>
+        <xs:attribute ref="pc:SystemInstanceName"/>
+        <xs:attribute ref="pc:AssociationName"/>
+      </xs:complexType>
+    </xs:element>
+    <xs:attribute name="EntityNamespace" type="xs:string"/>
+    <xs:attribute name="EntityName" type="xs:string"/>
+    <xs:attribute name="SystemInstanceName" type="xs:string"/>
+    <xs:attribute name="AssociationName" type="xs:string"/>
+    <xs:element name="BDCEntity">
+      <xs:complexType>
+        <xs:sequence>
+          <xs:element ref="pc:EntityDisplayName" minOccurs="0"/>
+          <xs:element ref="pc:EntityInstanceReference" minOccurs="0"/>
+          <xs:element ref="pc:EntityId1" minOccurs="0"/>
+          <xs:element ref="pc:EntityId2" minOccurs="0"/>
+          <xs:element ref="pc:EntityId3" minOccurs="0"/>
+          <xs:element ref="pc:EntityId4" minOccurs="0"/>
+          <xs:element ref="pc:EntityId5" minOccurs="0"/>
+        </xs:sequence>
+      </xs:complexType>
+    </xs:element>
+    <xs:element name="EntityDisplayName" type="xs:string"/>
+    <xs:element name="EntityInstanceReference" type="xs:string"/>
+    <xs:element name="EntityId1" type="xs:string"/>
+    <xs:element name="EntityId2" type="xs:string"/>
+    <xs:element name="EntityId3" type="xs:string"/>
+    <xs:element name="EntityId4" type="xs:string"/>
+    <xs:element name="EntityId5" type="xs:string"/>
+    <xs:element name="Terms">
+      <xs:complexType>
+        <xs:sequence>
+          <xs:element ref="pc:TermInfo" minOccurs="0" maxOccurs="unbounded"/>
+        </xs:sequence>
+      </xs:complexType>
+    </xs:element>
+    <xs:element name="TermInfo">
+      <xs:complexType>
+        <xs:sequence>
+          <xs:element ref="pc:TermName" minOccurs="0"/>
+          <xs:element ref="pc:TermId" minOccurs="0"/>
+        </xs:sequence>
+      </xs:complexType>
+    </xs:element>
+    <xs:element name="TermName" type="xs:string"/>
+    <xs:element name="TermId" type="xs:string"/>
+  </xs:schema>
+</ct:contentTypeSchema>
+</file>
+
+<file path=customXml/item2.xml><?xml version="1.0" encoding="utf-8"?>
+<?mso-contentType ?>
+<FormTemplates xmlns="http://schemas.microsoft.com/sharepoint/v3/contenttype/forms">
+  <Display>DocumentLibraryForm</Display>
+  <Edit>DocumentLibraryForm</Edit>
+  <New>DocumentLibraryForm</New>
+</FormTemplates>
+</file>
+
+<file path=customXml/item3.xml><?xml version="1.0" encoding="utf-8"?>
+<p:properties xmlns:p="http://schemas.microsoft.com/office/2006/metadata/properties" xmlns:xsi="http://www.w3.org/2001/XMLSchema-instance" xmlns:pc="http://schemas.microsoft.com/office/infopath/2007/PartnerControls">
+  <documentManagement/>
+</p:properties>
+</file>
+
+<file path=customXml/itemProps1.xml><?xml version="1.0" encoding="utf-8"?>
+<ds:datastoreItem xmlns:ds="http://schemas.openxmlformats.org/officeDocument/2006/customXml" ds:itemID="{183C8C93-0188-4111-86A3-0B940EAA7701}">
+  <ds:schemaRefs>
+    <ds:schemaRef ds:uri="8e8715b1-4f74-49a5-a4ef-72274251f188"/>
+    <ds:schemaRef ds:uri="http://purl.org/dc/elements/1.1/"/>
+    <ds:schemaRef ds:uri="http://purl.org/dc/terms/"/>
+    <ds:schemaRef ds:uri="http://schemas.microsoft.com/internal/obd"/>
+    <ds:schemaRef ds:uri="http://schemas.microsoft.com/office/2006/documentManagement/types"/>
+    <ds:schemaRef ds:uri="http://schemas.microsoft.com/office/2006/metadata/contentType"/>
+    <ds:schemaRef ds:uri="http://schemas.microsoft.com/office/2006/metadata/properties"/>
+    <ds:schemaRef ds:uri="http://schemas.microsoft.com/office/2006/metadata/properties/metaAttributes"/>
+    <ds:schemaRef ds:uri="http://schemas.microsoft.com/office/infopath/2007/PartnerControls"/>
+    <ds:schemaRef ds:uri="http://schemas.openxmlformats.org/package/2006/metadata/core-properties"/>
+    <ds:schemaRef ds:uri="http://www.w3.org/2001/XMLSchema"/>
+  </ds:schemaRefs>
+</ds:datastoreItem>
+</file>
+
+<file path=customXml/itemProps2.xml><?xml version="1.0" encoding="utf-8"?>
+<ds:datastoreItem xmlns:ds="http://schemas.openxmlformats.org/officeDocument/2006/customXml" ds:itemID="{4E4CE4B5-A942-4EA8-B40A-B91EBFC02623}">
+  <ds:schemaRefs>
+    <ds:schemaRef ds:uri="http://schemas.microsoft.com/sharepoint/v3/contenttype/forms"/>
+  </ds:schemaRefs>
+</ds:datastoreItem>
+</file>
+
+<file path=customXml/itemProps3.xml><?xml version="1.0" encoding="utf-8"?>
+<ds:datastoreItem xmlns:ds="http://schemas.openxmlformats.org/officeDocument/2006/customXml" ds:itemID="{15B46767-C95B-46EF-9C85-FE51199EF5AD}">
+  <ds:schemaRefs>
+    <ds:schemaRef ds:uri="http://schemas.microsoft.com/office/2006/documentManagement/types"/>
+    <ds:schemaRef ds:uri="http://schemas.microsoft.com/office/infopath/2007/PartnerControls"/>
+    <ds:schemaRef ds:uri="http://purl.org/dc/elements/1.1/"/>
+    <ds:schemaRef ds:uri="http://schemas.microsoft.com/office/2006/metadata/properties"/>
+    <ds:schemaRef ds:uri="http://purl.org/dc/terms/"/>
+    <ds:schemaRef ds:uri="http://schemas.openxmlformats.org/package/2006/metadata/core-properties"/>
+    <ds:schemaRef ds:uri="8e8715b1-4f74-49a5-a4ef-72274251f188"/>
+    <ds:schemaRef ds:uri="http://www.w3.org/XML/1998/namespace"/>
+    <ds:schemaRef ds:uri="http://purl.org/dc/dcmitype/"/>
+  </ds:schemaRefs>
+</ds:datastoreItem>
 </file>
</xml_diff>